<commit_message>
Add how to download exe
To the powerpoint, and updated the existing images
</commit_message>
<xml_diff>
--- a/TestPPT.pptx
+++ b/TestPPT.pptx
@@ -125,6 +125,11 @@
       </a:defRPr>
     </a:lvl9pPr>
   </p:defaultTextStyle>
+  <p:extLst>
+    <p:ext uri="{EFAFB233-063F-42B5-8137-9DF3F51BA10A}">
+      <p15:sldGuideLst xmlns:p15="http://schemas.microsoft.com/office/powerpoint/2012/main"/>
+    </p:ext>
+  </p:extLst>
 </p:presentation>
 </file>
 
@@ -277,7 +282,7 @@
           <a:p>
             <a:fld id="{2DE974FE-8FBB-4500-9ED5-FAB5F5087E28}" type="datetimeFigureOut">
               <a:rPr lang="en-GB" smtClean="0"/>
-              <a:t>12/12/2018</a:t>
+              <a:t>19/12/2018</a:t>
             </a:fld>
             <a:endParaRPr lang="en-GB"/>
           </a:p>
@@ -477,7 +482,7 @@
           <a:p>
             <a:fld id="{2DE974FE-8FBB-4500-9ED5-FAB5F5087E28}" type="datetimeFigureOut">
               <a:rPr lang="en-GB" smtClean="0"/>
-              <a:t>12/12/2018</a:t>
+              <a:t>19/12/2018</a:t>
             </a:fld>
             <a:endParaRPr lang="en-GB"/>
           </a:p>
@@ -687,7 +692,7 @@
           <a:p>
             <a:fld id="{2DE974FE-8FBB-4500-9ED5-FAB5F5087E28}" type="datetimeFigureOut">
               <a:rPr lang="en-GB" smtClean="0"/>
-              <a:t>12/12/2018</a:t>
+              <a:t>19/12/2018</a:t>
             </a:fld>
             <a:endParaRPr lang="en-GB"/>
           </a:p>
@@ -887,7 +892,7 @@
           <a:p>
             <a:fld id="{2DE974FE-8FBB-4500-9ED5-FAB5F5087E28}" type="datetimeFigureOut">
               <a:rPr lang="en-GB" smtClean="0"/>
-              <a:t>12/12/2018</a:t>
+              <a:t>19/12/2018</a:t>
             </a:fld>
             <a:endParaRPr lang="en-GB"/>
           </a:p>
@@ -1163,7 +1168,7 @@
           <a:p>
             <a:fld id="{2DE974FE-8FBB-4500-9ED5-FAB5F5087E28}" type="datetimeFigureOut">
               <a:rPr lang="en-GB" smtClean="0"/>
-              <a:t>12/12/2018</a:t>
+              <a:t>19/12/2018</a:t>
             </a:fld>
             <a:endParaRPr lang="en-GB"/>
           </a:p>
@@ -1431,7 +1436,7 @@
           <a:p>
             <a:fld id="{2DE974FE-8FBB-4500-9ED5-FAB5F5087E28}" type="datetimeFigureOut">
               <a:rPr lang="en-GB" smtClean="0"/>
-              <a:t>12/12/2018</a:t>
+              <a:t>19/12/2018</a:t>
             </a:fld>
             <a:endParaRPr lang="en-GB"/>
           </a:p>
@@ -1846,7 +1851,7 @@
           <a:p>
             <a:fld id="{2DE974FE-8FBB-4500-9ED5-FAB5F5087E28}" type="datetimeFigureOut">
               <a:rPr lang="en-GB" smtClean="0"/>
-              <a:t>12/12/2018</a:t>
+              <a:t>19/12/2018</a:t>
             </a:fld>
             <a:endParaRPr lang="en-GB"/>
           </a:p>
@@ -1988,7 +1993,7 @@
           <a:p>
             <a:fld id="{2DE974FE-8FBB-4500-9ED5-FAB5F5087E28}" type="datetimeFigureOut">
               <a:rPr lang="en-GB" smtClean="0"/>
-              <a:t>12/12/2018</a:t>
+              <a:t>19/12/2018</a:t>
             </a:fld>
             <a:endParaRPr lang="en-GB"/>
           </a:p>
@@ -2101,7 +2106,7 @@
           <a:p>
             <a:fld id="{2DE974FE-8FBB-4500-9ED5-FAB5F5087E28}" type="datetimeFigureOut">
               <a:rPr lang="en-GB" smtClean="0"/>
-              <a:t>12/12/2018</a:t>
+              <a:t>19/12/2018</a:t>
             </a:fld>
             <a:endParaRPr lang="en-GB"/>
           </a:p>
@@ -2414,7 +2419,7 @@
           <a:p>
             <a:fld id="{2DE974FE-8FBB-4500-9ED5-FAB5F5087E28}" type="datetimeFigureOut">
               <a:rPr lang="en-GB" smtClean="0"/>
-              <a:t>12/12/2018</a:t>
+              <a:t>19/12/2018</a:t>
             </a:fld>
             <a:endParaRPr lang="en-GB"/>
           </a:p>
@@ -2703,7 +2708,7 @@
           <a:p>
             <a:fld id="{2DE974FE-8FBB-4500-9ED5-FAB5F5087E28}" type="datetimeFigureOut">
               <a:rPr lang="en-GB" smtClean="0"/>
-              <a:t>12/12/2018</a:t>
+              <a:t>19/12/2018</a:t>
             </a:fld>
             <a:endParaRPr lang="en-GB"/>
           </a:p>
@@ -2946,7 +2951,7 @@
           <a:p>
             <a:fld id="{2DE974FE-8FBB-4500-9ED5-FAB5F5087E28}" type="datetimeFigureOut">
               <a:rPr lang="en-GB" smtClean="0"/>
-              <a:t>12/12/2018</a:t>
+              <a:t>19/12/2018</a:t>
             </a:fld>
             <a:endParaRPr lang="en-GB"/>
           </a:p>
@@ -3553,60 +3558,46 @@
           <a:bodyPr/>
           <a:lstStyle/>
           <a:p>
-            <a:pPr marL="0" indent="0">
-              <a:buNone/>
+            <a:pPr marL="514350" indent="-514350">
+              <a:buAutoNum type="arabicParenR"/>
             </a:pPr>
             <a:r>
               <a:rPr lang="en-GB" dirty="0"/>
-              <a:t>[steps needed to download program, maybe: </a:t>
-            </a:r>
-            <a:br>
-              <a:rPr lang="en-GB" dirty="0"/>
-            </a:br>
-            <a:r>
-              <a:rPr lang="en-GB" dirty="0"/>
-              <a:t>1) Download from </a:t>
-            </a:r>
-            <a:r>
-              <a:rPr lang="en-GB" dirty="0" err="1"/>
-              <a:t>github</a:t>
-            </a:r>
-            <a:r>
-              <a:rPr lang="en-GB" dirty="0"/>
-              <a:t> etc</a:t>
-            </a:r>
-          </a:p>
-          <a:p>
-            <a:pPr marL="0" indent="0">
-              <a:buNone/>
+              <a:t>Type into your browser: </a:t>
+            </a:r>
+            <a:r>
+              <a:rPr lang="en-GB" sz="3200" b="1" u="sng" dirty="0">
+                <a:solidFill>
+                  <a:srgbClr val="0070C0"/>
+                </a:solidFill>
+                <a:hlinkClick r:id="rId2"/>
+              </a:rPr>
+              <a:t>https://y11awards.page.link/download</a:t>
+            </a:r>
+            <a:endParaRPr lang="en-GB" sz="3200" b="1" u="sng" dirty="0">
+              <a:solidFill>
+                <a:srgbClr val="0070C0"/>
+              </a:solidFill>
+            </a:endParaRPr>
+          </a:p>
+          <a:p>
+            <a:pPr marL="514350" indent="-514350">
+              <a:buAutoNum type="arabicParenR"/>
             </a:pPr>
             <a:r>
-              <a:rPr lang="en-GB" dirty="0"/>
-              <a:t>2) Download from </a:t>
-            </a:r>
-            <a:r>
-              <a:rPr lang="en-GB" dirty="0" err="1"/>
-              <a:t>onenote</a:t>
+              <a:rPr lang="en-GB" sz="3200" dirty="0"/>
+              <a:t>The download should begin automatically</a:t>
+            </a:r>
+          </a:p>
+          <a:p>
+            <a:pPr marL="514350" indent="-514350">
+              <a:buAutoNum type="arabicParenR"/>
+            </a:pPr>
+            <a:r>
+              <a:rPr lang="en-GB" sz="3200" dirty="0"/>
+              <a:t>Run the file you just downloaded.</a:t>
             </a:r>
             <a:endParaRPr lang="en-GB" dirty="0"/>
-          </a:p>
-          <a:p>
-            <a:pPr marL="0" indent="0">
-              <a:buNone/>
-            </a:pPr>
-            <a:r>
-              <a:rPr lang="en-GB" dirty="0"/>
-              <a:t>3) Download via email</a:t>
-            </a:r>
-          </a:p>
-          <a:p>
-            <a:pPr marL="0" indent="0">
-              <a:buNone/>
-            </a:pPr>
-            <a:r>
-              <a:rPr lang="en-GB" dirty="0"/>
-              <a:t>]</a:t>
-            </a:r>
           </a:p>
         </p:txBody>
       </p:sp>
@@ -3620,11 +3611,11 @@
   <p:clrMapOvr>
     <a:masterClrMapping/>
   </p:clrMapOvr>
-  <mc:AlternateContent xmlns:mc="http://schemas.openxmlformats.org/markup-compatibility/2006">
-    <mc:Choice xmlns:p14="http://schemas.microsoft.com/office/powerpoint/2010/main" Requires="p14">
+  <mc:AlternateContent xmlns:mc="http://schemas.openxmlformats.org/markup-compatibility/2006" xmlns:p14="http://schemas.microsoft.com/office/powerpoint/2010/main">
+    <mc:Choice Requires="p14">
       <p:transition spd="slow" p14:dur="2000" advTm="15000"/>
     </mc:Choice>
-    <mc:Fallback>
+    <mc:Fallback xmlns="">
       <p:transition spd="slow" advTm="15000"/>
     </mc:Fallback>
   </mc:AlternateContent>
@@ -3678,7 +3669,7 @@
       </p:sp>
       <p:pic>
         <p:nvPicPr>
-          <p:cNvPr id="1026" name="Picture 2" descr="https://attachment.outlook.office.net/owa/CheAle14@coundoncourt.org/service.svc/s/GetFileAttachment?id=AAMkAGFkOTAyNjVkLWRlODYtNDJkYS1iMDdmLTM0ZGQ1OTM0ZDM5NQBGAAAAAAA9rfH3Mj%2BYQb78kfLMliw5BwAlUzXzTQdEQbtgBz9BcM57AM0s2oosAACtZbOmac7PT6j2ox1GUnMlAAITefGrAAABEgAQAA7NR0AYbgFPhyMx6WmzyMI%3D&amp;X-OWA-CANARY=mlRThYl2QUu7m11s2UO_FrDjfOoEYNYYbLL8vGLpEuxysRG4U600_kTpx7c6hlkduofPc7YEp7s.&amp;token=eyJhbGciOiJSUzI1NiIsImtpZCI6IjA2MDBGOUY2NzQ2MjA3MzdFNzM0MDRFMjg3QzQ1QTgxOENCN0NFQjgiLCJ4NXQiOiJCZ0Q1OW5SaUJ6Zm5OQVRpaDhSYWdZeTN6cmciLCJ0eXAiOiJKV1QifQ.eyJ2ZXIiOiJFeGNoYW5nZS5DYWxsYmFjay5WMSIsImFwcGN0eHNlbmRlciI6Ik93YURvd25sb2FkQDFmZDMzODYxLTQ1ZGMtNDhhNC05NThkLThkNDU4NjI1N2Y2ZiIsImFwcGN0eCI6IntcIm1zZXhjaHByb3RcIjpcIm93YVwiLFwicHJpbWFyeXNpZFwiOlwiUy0xLTUtMjEtMjI2ODkyMTAyNC0yNDczNDQ2NTgzLTE2MTU1OTIzMDQtMjIzMDQ2MFwiLFwicHVpZFwiOlwiMTE1MzgzNjI5NjU3NDg0MTM2MFwiLFwib2lkXCI6XCIxYjNhNmIyYy1mNWY0LTQwMjMtYmY1YS05MWU2NjUxMDA2ZmFcIixcInNjb3BlXCI6XCJPd2FEb3dubG9hZFwifSIsIm5iZiI6MTU0NDYwMDM1NSwiZXhwIjoxNTQ0NjAwOTU1LCJpc3MiOiIwMDAwMDAwMi0wMDAwLTBmZjEtY2UwMC0wMDAwMDAwMDAwMDBAMWZkMzM4NjEtNDVkYy00OGE0LTk1OGQtOGQ0NTg2MjU3ZjZmIiwiYXVkIjoiMDAwMDAwMDItMDAwMC0wZmYxLWNlMDAtMDAwMDAwMDAwMDAwL2F0dGFjaG1lbnQub3V0bG9vay5vZmZpY2UubmV0QDFmZDMzODYxLTQ1ZGMtNDhhNC05NThkLThkNDU4NjI1N2Y2ZiJ9.PrRIg71rG3alOVq708SMEa50RpBp4EtceHuC9VdKPnRSXUa9b4WFRCksZ4EzBSQ7YqcXDx779QLHzMpUgfNevEPVLz6uFC4J_IY70p1_pfaKlirP1lZ86EJ1FzpwYq5VDmjeNn9ZrQW9LcS1Sz6-FqLXnieg2ZplfIqwh3gNE8UAdLiOYrqJ978lYE0AJ1r99kZWVhJAJe1eLegozlX4EsZa2aTGr_cxaAZdAEsO7KryGTmr8EKHU3eZ_cbDsFwPWmemAWNNAt-2KLPG3D4QoQCurOYMwI6DldWFmUDQIP28eOM9u6E1__BP1k2lvcY6sgsWjZvQJjbAAil7RTYBxQ&amp;owa=outlook.office.com&amp;isImagePreview=True">
+          <p:cNvPr id="1026" name="Picture 2">
             <a:extLst>
               <a:ext uri="{FF2B5EF4-FFF2-40B4-BE49-F238E27FC236}">
                 <a16:creationId xmlns:a16="http://schemas.microsoft.com/office/drawing/2014/main" id="{E48D4DA3-73F5-4B36-8B5B-F6FE352E4CE2}"/>
@@ -3700,12 +3691,15 @@
               </a:ext>
             </a:extLst>
           </a:blip>
-          <a:srcRect l="10781" r="10781"/>
           <a:stretch>
             <a:fillRect/>
           </a:stretch>
         </p:blipFill>
         <p:spPr bwMode="auto">
+          <a:xfrm>
+            <a:off x="5183188" y="1499781"/>
+            <a:ext cx="6172200" cy="3848912"/>
+          </a:xfrm>
           <a:prstGeom prst="rect">
             <a:avLst/>
           </a:prstGeom>
@@ -3779,11 +3773,11 @@
   <p:clrMapOvr>
     <a:masterClrMapping/>
   </p:clrMapOvr>
-  <mc:AlternateContent xmlns:mc="http://schemas.openxmlformats.org/markup-compatibility/2006">
-    <mc:Choice xmlns:p14="http://schemas.microsoft.com/office/powerpoint/2010/main" Requires="p14">
+  <mc:AlternateContent xmlns:mc="http://schemas.openxmlformats.org/markup-compatibility/2006" xmlns:p14="http://schemas.microsoft.com/office/powerpoint/2010/main">
+    <mc:Choice Requires="p14">
       <p:transition spd="slow" p14:dur="2000" advTm="10000"/>
     </mc:Choice>
-    <mc:Fallback>
+    <mc:Fallback xmlns="">
       <p:transition spd="slow" advTm="10000"/>
     </mc:Fallback>
   </mc:AlternateContent>
@@ -3836,29 +3830,7 @@
           <a:p>
             <a:r>
               <a:rPr lang="en-GB" dirty="0"/>
-              <a:t>In the white text area below “</a:t>
-            </a:r>
-            <a:r>
-              <a:rPr lang="en-GB" b="1" dirty="0"/>
-              <a:t>Male</a:t>
-            </a:r>
-            <a:r>
-              <a:rPr lang="en-GB" dirty="0"/>
-              <a:t>” and “</a:t>
-            </a:r>
-            <a:r>
-              <a:rPr lang="en-GB" b="1" dirty="0"/>
-              <a:t>Female</a:t>
-            </a:r>
-            <a:r>
-              <a:rPr lang="en-GB" dirty="0"/>
-              <a:t>” type the name of the person you wish to vote for</a:t>
-            </a:r>
-          </a:p>
-          <a:p>
-            <a:r>
-              <a:rPr lang="en-GB" dirty="0"/>
-              <a:t>As you type, a list of names will appear below the text area.</a:t>
+              <a:t>In the white text area, below “First choice” and “Second choice”, you will need to type the name of two people that you are voting for.</a:t>
             </a:r>
           </a:p>
           <a:p>
@@ -3906,7 +3878,7 @@
       </p:sp>
       <p:pic>
         <p:nvPicPr>
-          <p:cNvPr id="14" name="Picture Placeholder 13" descr="A screenshot of a cell phone&#10;&#10;Description automatically generated">
+          <p:cNvPr id="14" name="Picture Placeholder 13">
             <a:extLst>
               <a:ext uri="{FF2B5EF4-FFF2-40B4-BE49-F238E27FC236}">
                 <a16:creationId xmlns:a16="http://schemas.microsoft.com/office/drawing/2014/main" id="{A1DD72BD-E332-48BD-9FCE-ABEA87D8C8FA}"/>
@@ -3934,56 +3906,39 @@
         </p:blipFill>
         <p:spPr>
           <a:xfrm>
-            <a:off x="4876800" y="987425"/>
-            <a:ext cx="7105800" cy="4743450"/>
+            <a:off x="4876800" y="1143603"/>
+            <a:ext cx="7105800" cy="4431094"/>
           </a:xfrm>
         </p:spPr>
       </p:pic>
       <p:pic>
         <p:nvPicPr>
-          <p:cNvPr id="2056" name="Picture 8" descr="https://attachment.outlook.office.net/owa/CheAle14@coundoncourt.org/service.svc/s/GetFileAttachment?id=AAMkAGFkOTAyNjVkLWRlODYtNDJkYS1iMDdmLTM0ZGQ1OTM0ZDM5NQBGAAAAAAA9rfH3Mj%2BYQb78kfLMliw5BwAlUzXzTQdEQbtgBz9BcM57AM0s2oosAACtZbOmac7PT6j2ox1GUnMlAAITefGrAAABEgAQACS441evHxRHjUBY7jM9eGY%3D&amp;X-OWA-CANARY=mlRThYl2QUu7m11s2UO_FrDjfOoEYNYYbLL8vGLpEuxysRG4U600_kTpx7c6hlkduofPc7YEp7s.&amp;token=eyJhbGciOiJSUzI1NiIsImtpZCI6IjA2MDBGOUY2NzQ2MjA3MzdFNzM0MDRFMjg3QzQ1QTgxOENCN0NFQjgiLCJ4NXQiOiJCZ0Q1OW5SaUJ6Zm5OQVRpaDhSYWdZeTN6cmciLCJ0eXAiOiJKV1QifQ.eyJ2ZXIiOiJFeGNoYW5nZS5DYWxsYmFjay5WMSIsImFwcGN0eHNlbmRlciI6Ik93YURvd25sb2FkQDFmZDMzODYxLTQ1ZGMtNDhhNC05NThkLThkNDU4NjI1N2Y2ZiIsImFwcGN0eCI6IntcIm1zZXhjaHByb3RcIjpcIm93YVwiLFwicHJpbWFyeXNpZFwiOlwiUy0xLTUtMjEtMjI2ODkyMTAyNC0yNDczNDQ2NTgzLTE2MTU1OTIzMDQtMjIzMDQ2MFwiLFwicHVpZFwiOlwiMTE1MzgzNjI5NjU3NDg0MTM2MFwiLFwib2lkXCI6XCIxYjNhNmIyYy1mNWY0LTQwMjMtYmY1YS05MWU2NjUxMDA2ZmFcIixcInNjb3BlXCI6XCJPd2FEb3dubG9hZFwifSIsIm5iZiI6MTU0NDYwMDM1NSwiZXhwIjoxNTQ0NjAwOTU1LCJpc3MiOiIwMDAwMDAwMi0wMDAwLTBmZjEtY2UwMC0wMDAwMDAwMDAwMDBAMWZkMzM4NjEtNDVkYy00OGE0LTk1OGQtOGQ0NTg2MjU3ZjZmIiwiYXVkIjoiMDAwMDAwMDItMDAwMC0wZmYxLWNlMDAtMDAwMDAwMDAwMDAwL2F0dGFjaG1lbnQub3V0bG9vay5vZmZpY2UubmV0QDFmZDMzODYxLTQ1ZGMtNDhhNC05NThkLThkNDU4NjI1N2Y2ZiJ9.PrRIg71rG3alOVq708SMEa50RpBp4EtceHuC9VdKPnRSXUa9b4WFRCksZ4EzBSQ7YqcXDx779QLHzMpUgfNevEPVLz6uFC4J_IY70p1_pfaKlirP1lZ86EJ1FzpwYq5VDmjeNn9ZrQW9LcS1Sz6-FqLXnieg2ZplfIqwh3gNE8UAdLiOYrqJ978lYE0AJ1r99kZWVhJAJe1eLegozlX4EsZa2aTGr_cxaAZdAEsO7KryGTmr8EKHU3eZ_cbDsFwPWmemAWNNAt-2KLPG3D4QoQCurOYMwI6DldWFmUDQIP28eOM9u6E1__BP1k2lvcY6sgsWjZvQJjbAAil7RTYBxQ&amp;owa=outlook.office.com&amp;isImagePreview=True">
-            <a:extLst>
-              <a:ext uri="{FF2B5EF4-FFF2-40B4-BE49-F238E27FC236}">
-                <a16:creationId xmlns:a16="http://schemas.microsoft.com/office/drawing/2014/main" id="{7E1C330E-6A49-4520-A533-9FD18058B5AF}"/>
+          <p:cNvPr id="3" name="Picture 2">
+            <a:extLst>
+              <a:ext uri="{FF2B5EF4-FFF2-40B4-BE49-F238E27FC236}">
+                <a16:creationId xmlns:a16="http://schemas.microsoft.com/office/drawing/2014/main" id="{C987D9B7-3696-4028-9999-5ACD40EF2A17}"/>
               </a:ext>
             </a:extLst>
           </p:cNvPr>
           <p:cNvPicPr>
-            <a:picLocks noChangeAspect="1" noChangeArrowheads="1"/>
+            <a:picLocks noChangeAspect="1"/>
           </p:cNvPicPr>
           <p:nvPr/>
         </p:nvPicPr>
         <p:blipFill>
-          <a:blip r:embed="rId3">
-            <a:extLst>
-              <a:ext uri="{28A0092B-C50C-407E-A947-70E740481C1C}">
-                <a14:useLocalDpi xmlns:a14="http://schemas.microsoft.com/office/drawing/2010/main" val="0"/>
-              </a:ext>
-            </a:extLst>
-          </a:blip>
-          <a:srcRect/>
+          <a:blip r:embed="rId3"/>
           <a:stretch>
             <a:fillRect/>
           </a:stretch>
         </p:blipFill>
-        <p:spPr bwMode="auto">
+        <p:spPr>
           <a:xfrm>
-            <a:off x="4891087" y="2057400"/>
-            <a:ext cx="2409825" cy="1619250"/>
+            <a:off x="4876800" y="2149475"/>
+            <a:ext cx="2771775" cy="933450"/>
           </a:xfrm>
           <a:prstGeom prst="rect">
             <a:avLst/>
           </a:prstGeom>
-          <a:noFill/>
-          <a:extLst>
-            <a:ext uri="{909E8E84-426E-40DD-AFC4-6F175D3DCCD1}">
-              <a14:hiddenFill xmlns:a14="http://schemas.microsoft.com/office/drawing/2010/main">
-                <a:solidFill>
-                  <a:srgbClr val="FFFFFF"/>
-                </a:solidFill>
-              </a14:hiddenFill>
-            </a:ext>
-          </a:extLst>
         </p:spPr>
       </p:pic>
     </p:spTree>
@@ -3996,11 +3951,11 @@
   <p:clrMapOvr>
     <a:masterClrMapping/>
   </p:clrMapOvr>
-  <mc:AlternateContent xmlns:mc="http://schemas.openxmlformats.org/markup-compatibility/2006">
-    <mc:Choice xmlns:p14="http://schemas.microsoft.com/office/powerpoint/2010/main" Requires="p14">
+  <mc:AlternateContent xmlns:mc="http://schemas.openxmlformats.org/markup-compatibility/2006" xmlns:p14="http://schemas.microsoft.com/office/powerpoint/2010/main">
+    <mc:Choice Requires="p14">
       <p:transition spd="slow" p14:dur="2000" advTm="10000"/>
     </mc:Choice>
-    <mc:Fallback>
+    <mc:Fallback xmlns="">
       <p:transition spd="slow" advTm="10000"/>
     </mc:Fallback>
   </mc:AlternateContent>
@@ -4054,7 +4009,7 @@
       </p:sp>
       <p:pic>
         <p:nvPicPr>
-          <p:cNvPr id="6" name="Picture Placeholder 5" descr="A screenshot of a cell phone&#10;&#10;Description automatically generated">
+          <p:cNvPr id="6" name="Picture Placeholder 5">
             <a:extLst>
               <a:ext uri="{FF2B5EF4-FFF2-40B4-BE49-F238E27FC236}">
                 <a16:creationId xmlns:a16="http://schemas.microsoft.com/office/drawing/2014/main" id="{60CCDE29-A95E-403A-9392-646563640E31}"/>
@@ -4082,8 +4037,8 @@
         </p:blipFill>
         <p:spPr>
           <a:xfrm>
-            <a:off x="4772024" y="987425"/>
-            <a:ext cx="7190199" cy="4733925"/>
+            <a:off x="4772024" y="1112525"/>
+            <a:ext cx="7190199" cy="4483724"/>
           </a:xfrm>
         </p:spPr>
       </p:pic>
@@ -4131,11 +4086,11 @@
   <p:clrMapOvr>
     <a:masterClrMapping/>
   </p:clrMapOvr>
-  <mc:AlternateContent xmlns:mc="http://schemas.openxmlformats.org/markup-compatibility/2006">
-    <mc:Choice xmlns:p14="http://schemas.microsoft.com/office/powerpoint/2010/main" Requires="p14">
+  <mc:AlternateContent xmlns:mc="http://schemas.openxmlformats.org/markup-compatibility/2006" xmlns:p14="http://schemas.microsoft.com/office/powerpoint/2010/main">
+    <mc:Choice Requires="p14">
       <p:transition spd="slow" p14:dur="2000" advTm="10000"/>
     </mc:Choice>
-    <mc:Fallback>
+    <mc:Fallback xmlns="">
       <p:transition spd="slow" advTm="10000"/>
     </mc:Fallback>
   </mc:AlternateContent>
@@ -4228,7 +4183,7 @@
       </p:sp>
       <p:pic>
         <p:nvPicPr>
-          <p:cNvPr id="3076" name="Picture 4" descr="https://attachment.outlook.office.net/owa/CheAle14@coundoncourt.org/service.svc/s/GetFileAttachment?id=AAMkAGFkOTAyNjVkLWRlODYtNDJkYS1iMDdmLTM0ZGQ1OTM0ZDM5NQBGAAAAAAA9rfH3Mj%2BYQb78kfLMliw5BwAlUzXzTQdEQbtgBz9BcM57AM0s2oosAACtZbOmac7PT6j2ox1GUnMlAAITefGrAAABEgAQADKwjykwZUxDq2RiylDG%2BFM%3D&amp;X-OWA-CANARY=24mkVhLL606ypNbunfQ54dCSxsgFYNYYJVGF6MuwSQ9MP3K5FJA_Xnhqh6dtLDLYxpNAfR6sijM.&amp;token=eyJhbGciOiJSUzI1NiIsImtpZCI6IjA2MDBGOUY2NzQ2MjA3MzdFNzM0MDRFMjg3QzQ1QTgxOENCN0NFQjgiLCJ4NXQiOiJCZ0Q1OW5SaUJ6Zm5OQVRpaDhSYWdZeTN6cmciLCJ0eXAiOiJKV1QifQ.eyJ2ZXIiOiJFeGNoYW5nZS5DYWxsYmFjay5WMSIsImFwcGN0eHNlbmRlciI6Ik93YURvd25sb2FkQDFmZDMzODYxLTQ1ZGMtNDhhNC05NThkLThkNDU4NjI1N2Y2ZiIsImFwcGN0eCI6IntcIm1zZXhjaHByb3RcIjpcIm93YVwiLFwicHJpbWFyeXNpZFwiOlwiUy0xLTUtMjEtMjI2ODkyMTAyNC0yNDczNDQ2NTgzLTE2MTU1OTIzMDQtMjIzMDQ2MFwiLFwicHVpZFwiOlwiMTE1MzgzNjI5NjU3NDg0MTM2MFwiLFwib2lkXCI6XCIxYjNhNmIyYy1mNWY0LTQwMjMtYmY1YS05MWU2NjUxMDA2ZmFcIixcInNjb3BlXCI6XCJPd2FEb3dubG9hZFwifSIsIm5iZiI6MTU0NDYwMDY1NSwiZXhwIjoxNTQ0NjAxMjU1LCJpc3MiOiIwMDAwMDAwMi0wMDAwLTBmZjEtY2UwMC0wMDAwMDAwMDAwMDBAMWZkMzM4NjEtNDVkYy00OGE0LTk1OGQtOGQ0NTg2MjU3ZjZmIiwiYXVkIjoiMDAwMDAwMDItMDAwMC0wZmYxLWNlMDAtMDAwMDAwMDAwMDAwL2F0dGFjaG1lbnQub3V0bG9vay5vZmZpY2UubmV0QDFmZDMzODYxLTQ1ZGMtNDhhNC05NThkLThkNDU4NjI1N2Y2ZiJ9.JflnX-aXhqTu8yEoONF5KXAk0bGMEiPdSHyCAiX2yGk8kZ9iQliwai1Ccy7gFcWiZiXKDMe6Q_aUSIOm7ZYnA8lBbkt-6XP2hRXcxJ6dKMBHLqYoxdEohaAqr4vhHLKpu1uZSLpCDp9pBrSHUKdF8EorbDCITBNUQHaHb9ZAABVaQuU9Een6aRPe59Tw50fYJyWHE45Hi-EdfKNEdTEnODdkBCYYuJR8SZxS9UZ8bdhh97bgU9buI8WOPcp3NklN6b2ozbryrMhOOZCusZKEZXo5GTQHjbeUuzLG6LVCtn0gJHRkvvUYdMPf1iUHOdscfT1bMN8X1NAbstzEJHC05w&amp;owa=outlook.office.com&amp;isImagePreview=True">
+          <p:cNvPr id="3076" name="Picture 4">
             <a:extLst>
               <a:ext uri="{FF2B5EF4-FFF2-40B4-BE49-F238E27FC236}">
                 <a16:creationId xmlns:a16="http://schemas.microsoft.com/office/drawing/2014/main" id="{9B127A42-F601-4244-8366-14CC0615C3A5}"/>
@@ -4256,8 +4211,8 @@
         </p:blipFill>
         <p:spPr bwMode="auto">
           <a:xfrm>
-            <a:off x="5327541" y="2057400"/>
-            <a:ext cx="6299423" cy="1244600"/>
+            <a:off x="5553111" y="2057400"/>
+            <a:ext cx="5848283" cy="1244600"/>
           </a:xfrm>
           <a:prstGeom prst="rect">
             <a:avLst/>
@@ -4284,11 +4239,11 @@
   <p:clrMapOvr>
     <a:masterClrMapping/>
   </p:clrMapOvr>
-  <mc:AlternateContent xmlns:mc="http://schemas.openxmlformats.org/markup-compatibility/2006">
-    <mc:Choice xmlns:p14="http://schemas.microsoft.com/office/powerpoint/2010/main" Requires="p14">
+  <mc:AlternateContent xmlns:mc="http://schemas.openxmlformats.org/markup-compatibility/2006" xmlns:p14="http://schemas.microsoft.com/office/powerpoint/2010/main">
+    <mc:Choice Requires="p14">
       <p:transition spd="slow" p14:dur="2000" advTm="10000"/>
     </mc:Choice>
-    <mc:Fallback>
+    <mc:Fallback xmlns="">
       <p:transition spd="slow" advTm="10000"/>
     </mc:Fallback>
   </mc:AlternateContent>

</xml_diff>

<commit_message>
Swap hypens for colons
Close #56
Also, updated powerpoint to have both a manual and automatic way to advance to next slide.
</commit_message>
<xml_diff>
--- a/TestPPT.pptx
+++ b/TestPPT.pptx
@@ -11,11 +11,25 @@
     <p:sldId id="259" r:id="rId5"/>
     <p:sldId id="260" r:id="rId6"/>
     <p:sldId id="261" r:id="rId7"/>
+    <p:sldId id="262" r:id="rId8"/>
+    <p:sldId id="263" r:id="rId9"/>
+    <p:sldId id="264" r:id="rId10"/>
+    <p:sldId id="265" r:id="rId11"/>
+    <p:sldId id="266" r:id="rId12"/>
   </p:sldIdLst>
   <p:sldSz cx="12192000" cy="6858000"/>
   <p:notesSz cx="6858000" cy="9144000"/>
   <p:custShowLst>
-    <p:custShow name="JustInfo" id="0">
+    <p:custShow name="AutoLoop" id="0">
+      <p:sldLst>
+        <p:sld r:id="rId8"/>
+        <p:sld r:id="rId9"/>
+        <p:sld r:id="rId10"/>
+        <p:sld r:id="rId11"/>
+        <p:sld r:id="rId12"/>
+      </p:sldLst>
+    </p:custShow>
+    <p:custShow name="NonAuto" id="1">
       <p:sldLst>
         <p:sld r:id="rId3"/>
         <p:sld r:id="rId4"/>
@@ -24,7 +38,7 @@
         <p:sld r:id="rId7"/>
       </p:sldLst>
     </p:custShow>
-    <p:custShow name="MainPage" id="1">
+    <p:custShow name="FirstsPageOnly" id="2">
       <p:sldLst>
         <p:sld r:id="rId2"/>
       </p:sldLst>
@@ -133,6 +147,54 @@
 </p:presentation>
 </file>
 
+<file path=ppt/commentAuthors.xml><?xml version="1.0" encoding="utf-8"?>
+<p:cmAuthorLst xmlns:a="http://schemas.openxmlformats.org/drawingml/2006/main" xmlns:r="http://schemas.openxmlformats.org/officeDocument/2006/relationships" xmlns:p="http://schemas.openxmlformats.org/presentationml/2006/main">
+  <p:cmAuthor id="1" name="Alex Chester" initials="AC" lastIdx="4" clrIdx="0">
+    <p:extLst>
+      <p:ext uri="{19B8F6BF-5375-455C-9EA6-DF929625EA0E}">
+        <p15:presenceInfo xmlns:p15="http://schemas.microsoft.com/office/powerpoint/2012/main" userId="dbb2f7c1f378fe7e" providerId="Windows Live"/>
+      </p:ext>
+    </p:extLst>
+  </p:cmAuthor>
+</p:cmAuthorLst>
+</file>
+
+<file path=ppt/comments/comment1.xml><?xml version="1.0" encoding="utf-8"?>
+<p:cmLst xmlns:a="http://schemas.openxmlformats.org/drawingml/2006/main" xmlns:r="http://schemas.openxmlformats.org/officeDocument/2006/relationships" xmlns:p="http://schemas.openxmlformats.org/presentationml/2006/main">
+  <p:cm authorId="1" dt="2018-12-29T16:20:53.546" idx="1">
+    <p:pos x="10" y="10"/>
+    <p:text>The powerpoint should be started by using the "Custom SlideShow" option and selecting 'MainPageOnly'</p:text>
+    <p:extLst>
+      <p:ext uri="{C676402C-5697-4E1C-873F-D02D1690AC5C}">
+        <p15:threadingInfo xmlns:p15="http://schemas.microsoft.com/office/powerpoint/2012/main" timeZoneBias="0"/>
+      </p:ext>
+    </p:extLst>
+  </p:cm>
+  <p:cm authorId="1" dt="2018-12-29T16:21:55.545" idx="2">
+    <p:pos x="10" y="146"/>
+    <p:text>From there, you may select 'Manual' - to click through the options as desired</p:text>
+    <p:extLst>
+      <p:ext uri="{C676402C-5697-4E1C-873F-D02D1690AC5C}">
+        <p15:threadingInfo xmlns:p15="http://schemas.microsoft.com/office/powerpoint/2012/main" timeZoneBias="0">
+          <p15:parentCm authorId="1" idx="1"/>
+        </p15:threadingInfo>
+      </p:ext>
+    </p:extLst>
+  </p:cm>
+  <p:cm authorId="1" dt="2018-12-29T16:22:19.297" idx="4">
+    <p:pos x="10" y="282"/>
+    <p:text>Or, you may select 'Auto' - to have the computer loop through it automatically</p:text>
+    <p:extLst>
+      <p:ext uri="{C676402C-5697-4E1C-873F-D02D1690AC5C}">
+        <p15:threadingInfo xmlns:p15="http://schemas.microsoft.com/office/powerpoint/2012/main" timeZoneBias="0">
+          <p15:parentCm authorId="1" idx="1"/>
+        </p15:threadingInfo>
+      </p:ext>
+    </p:extLst>
+  </p:cm>
+</p:cmLst>
+</file>
+
 <file path=ppt/slideLayouts/slideLayout1.xml><?xml version="1.0" encoding="utf-8"?>
 <p:sldLayout xmlns:a="http://schemas.openxmlformats.org/drawingml/2006/main" xmlns:r="http://schemas.openxmlformats.org/officeDocument/2006/relationships" xmlns:p="http://schemas.openxmlformats.org/presentationml/2006/main" type="title" preserve="1">
   <p:cSld name="Title Slide">
@@ -282,7 +344,7 @@
           <a:p>
             <a:fld id="{2DE974FE-8FBB-4500-9ED5-FAB5F5087E28}" type="datetimeFigureOut">
               <a:rPr lang="en-GB" smtClean="0"/>
-              <a:t>20/12/2018</a:t>
+              <a:t>29/12/2018</a:t>
             </a:fld>
             <a:endParaRPr lang="en-GB"/>
           </a:p>
@@ -482,7 +544,7 @@
           <a:p>
             <a:fld id="{2DE974FE-8FBB-4500-9ED5-FAB5F5087E28}" type="datetimeFigureOut">
               <a:rPr lang="en-GB" smtClean="0"/>
-              <a:t>20/12/2018</a:t>
+              <a:t>29/12/2018</a:t>
             </a:fld>
             <a:endParaRPr lang="en-GB"/>
           </a:p>
@@ -692,7 +754,7 @@
           <a:p>
             <a:fld id="{2DE974FE-8FBB-4500-9ED5-FAB5F5087E28}" type="datetimeFigureOut">
               <a:rPr lang="en-GB" smtClean="0"/>
-              <a:t>20/12/2018</a:t>
+              <a:t>29/12/2018</a:t>
             </a:fld>
             <a:endParaRPr lang="en-GB"/>
           </a:p>
@@ -892,7 +954,7 @@
           <a:p>
             <a:fld id="{2DE974FE-8FBB-4500-9ED5-FAB5F5087E28}" type="datetimeFigureOut">
               <a:rPr lang="en-GB" smtClean="0"/>
-              <a:t>20/12/2018</a:t>
+              <a:t>29/12/2018</a:t>
             </a:fld>
             <a:endParaRPr lang="en-GB"/>
           </a:p>
@@ -1168,7 +1230,7 @@
           <a:p>
             <a:fld id="{2DE974FE-8FBB-4500-9ED5-FAB5F5087E28}" type="datetimeFigureOut">
               <a:rPr lang="en-GB" smtClean="0"/>
-              <a:t>20/12/2018</a:t>
+              <a:t>29/12/2018</a:t>
             </a:fld>
             <a:endParaRPr lang="en-GB"/>
           </a:p>
@@ -1436,7 +1498,7 @@
           <a:p>
             <a:fld id="{2DE974FE-8FBB-4500-9ED5-FAB5F5087E28}" type="datetimeFigureOut">
               <a:rPr lang="en-GB" smtClean="0"/>
-              <a:t>20/12/2018</a:t>
+              <a:t>29/12/2018</a:t>
             </a:fld>
             <a:endParaRPr lang="en-GB"/>
           </a:p>
@@ -1851,7 +1913,7 @@
           <a:p>
             <a:fld id="{2DE974FE-8FBB-4500-9ED5-FAB5F5087E28}" type="datetimeFigureOut">
               <a:rPr lang="en-GB" smtClean="0"/>
-              <a:t>20/12/2018</a:t>
+              <a:t>29/12/2018</a:t>
             </a:fld>
             <a:endParaRPr lang="en-GB"/>
           </a:p>
@@ -1993,7 +2055,7 @@
           <a:p>
             <a:fld id="{2DE974FE-8FBB-4500-9ED5-FAB5F5087E28}" type="datetimeFigureOut">
               <a:rPr lang="en-GB" smtClean="0"/>
-              <a:t>20/12/2018</a:t>
+              <a:t>29/12/2018</a:t>
             </a:fld>
             <a:endParaRPr lang="en-GB"/>
           </a:p>
@@ -2106,7 +2168,7 @@
           <a:p>
             <a:fld id="{2DE974FE-8FBB-4500-9ED5-FAB5F5087E28}" type="datetimeFigureOut">
               <a:rPr lang="en-GB" smtClean="0"/>
-              <a:t>20/12/2018</a:t>
+              <a:t>29/12/2018</a:t>
             </a:fld>
             <a:endParaRPr lang="en-GB"/>
           </a:p>
@@ -2419,7 +2481,7 @@
           <a:p>
             <a:fld id="{2DE974FE-8FBB-4500-9ED5-FAB5F5087E28}" type="datetimeFigureOut">
               <a:rPr lang="en-GB" smtClean="0"/>
-              <a:t>20/12/2018</a:t>
+              <a:t>29/12/2018</a:t>
             </a:fld>
             <a:endParaRPr lang="en-GB"/>
           </a:p>
@@ -2708,7 +2770,7 @@
           <a:p>
             <a:fld id="{2DE974FE-8FBB-4500-9ED5-FAB5F5087E28}" type="datetimeFigureOut">
               <a:rPr lang="en-GB" smtClean="0"/>
-              <a:t>20/12/2018</a:t>
+              <a:t>29/12/2018</a:t>
             </a:fld>
             <a:endParaRPr lang="en-GB"/>
           </a:p>
@@ -2951,7 +3013,7 @@
           <a:p>
             <a:fld id="{2DE974FE-8FBB-4500-9ED5-FAB5F5087E28}" type="datetimeFigureOut">
               <a:rPr lang="en-GB" smtClean="0"/>
-              <a:t>20/12/2018</a:t>
+              <a:t>29/12/2018</a:t>
             </a:fld>
             <a:endParaRPr lang="en-GB"/>
           </a:p>
@@ -3403,36 +3465,11 @@
       </p:sp>
       <p:sp>
         <p:nvSpPr>
-          <p:cNvPr id="3" name="Subtitle 2">
-            <a:extLst>
-              <a:ext uri="{FF2B5EF4-FFF2-40B4-BE49-F238E27FC236}">
-                <a16:creationId xmlns:a16="http://schemas.microsoft.com/office/drawing/2014/main" id="{78F92DE3-DF75-4FC1-AAD8-A7FA74D5D624}"/>
-              </a:ext>
-            </a:extLst>
-          </p:cNvPr>
-          <p:cNvSpPr>
-            <a:spLocks noGrp="1"/>
-          </p:cNvSpPr>
-          <p:nvPr>
-            <p:ph type="subTitle" idx="1"/>
-          </p:nvPr>
-        </p:nvSpPr>
-        <p:spPr/>
-        <p:txBody>
-          <a:bodyPr/>
-          <a:lstStyle/>
-          <a:p>
-            <a:endParaRPr lang="en-GB"/>
-          </a:p>
-        </p:txBody>
-      </p:sp>
-      <p:sp>
-        <p:nvSpPr>
-          <p:cNvPr id="4" name="Rectangle 3">
-            <a:hlinkClick r:id="" action="ppaction://customshow?id=0"/>
-            <a:extLst>
-              <a:ext uri="{FF2B5EF4-FFF2-40B4-BE49-F238E27FC236}">
-                <a16:creationId xmlns:a16="http://schemas.microsoft.com/office/drawing/2014/main" id="{9F0A1C84-400D-4601-B03D-CEFEF908798C}"/>
+          <p:cNvPr id="5" name="Rectangle 4">
+            <a:hlinkClick r:id="" action="ppaction://customshow?id=1&amp;return=true"/>
+            <a:extLst>
+              <a:ext uri="{FF2B5EF4-FFF2-40B4-BE49-F238E27FC236}">
+                <a16:creationId xmlns:a16="http://schemas.microsoft.com/office/drawing/2014/main" id="{FA5FE56A-3B8A-409C-A271-7721788BA35E}"/>
               </a:ext>
             </a:extLst>
           </p:cNvPr>
@@ -3441,8 +3478,8 @@
         </p:nvSpPr>
         <p:spPr>
           <a:xfrm>
-            <a:off x="0" y="0"/>
-            <a:ext cx="12192000" cy="6858000"/>
+            <a:off x="3275045" y="5085184"/>
+            <a:ext cx="1147665" cy="650453"/>
           </a:xfrm>
           <a:prstGeom prst="rect">
             <a:avLst/>
@@ -3450,7 +3487,7 @@
           <a:noFill/>
           <a:ln>
             <a:solidFill>
-              <a:srgbClr val="FF0000"/>
+              <a:schemeClr val="tx1"/>
             </a:solidFill>
           </a:ln>
         </p:spPr>
@@ -3475,7 +3512,78 @@
           <a:lstStyle/>
           <a:p>
             <a:pPr algn="ctr"/>
-            <a:endParaRPr lang="en-GB"/>
+            <a:r>
+              <a:rPr lang="en-GB" dirty="0">
+                <a:solidFill>
+                  <a:schemeClr val="bg1">
+                    <a:lumMod val="85000"/>
+                  </a:schemeClr>
+                </a:solidFill>
+              </a:rPr>
+              <a:t>Manual</a:t>
+            </a:r>
+          </a:p>
+        </p:txBody>
+      </p:sp>
+      <p:sp>
+        <p:nvSpPr>
+          <p:cNvPr id="6" name="Rectangle 5">
+            <a:hlinkClick r:id="" action="ppaction://customshow?id=0&amp;return=true"/>
+            <a:extLst>
+              <a:ext uri="{FF2B5EF4-FFF2-40B4-BE49-F238E27FC236}">
+                <a16:creationId xmlns:a16="http://schemas.microsoft.com/office/drawing/2014/main" id="{8AC9F4F2-BB5F-44E7-934B-6C717F8E4348}"/>
+              </a:ext>
+            </a:extLst>
+          </p:cNvPr>
+          <p:cNvSpPr/>
+          <p:nvPr/>
+        </p:nvSpPr>
+        <p:spPr>
+          <a:xfrm>
+            <a:off x="7769292" y="5085183"/>
+            <a:ext cx="1147665" cy="650453"/>
+          </a:xfrm>
+          <a:prstGeom prst="rect">
+            <a:avLst/>
+          </a:prstGeom>
+          <a:noFill/>
+          <a:ln>
+            <a:solidFill>
+              <a:schemeClr val="tx1"/>
+            </a:solidFill>
+          </a:ln>
+        </p:spPr>
+        <p:style>
+          <a:lnRef idx="2">
+            <a:schemeClr val="accent1">
+              <a:shade val="50000"/>
+            </a:schemeClr>
+          </a:lnRef>
+          <a:fillRef idx="1">
+            <a:schemeClr val="accent1"/>
+          </a:fillRef>
+          <a:effectRef idx="0">
+            <a:schemeClr val="accent1"/>
+          </a:effectRef>
+          <a:fontRef idx="minor">
+            <a:schemeClr val="lt1"/>
+          </a:fontRef>
+        </p:style>
+        <p:txBody>
+          <a:bodyPr rtlCol="0" anchor="ctr"/>
+          <a:lstStyle/>
+          <a:p>
+            <a:pPr algn="ctr"/>
+            <a:r>
+              <a:rPr lang="en-GB" dirty="0">
+                <a:solidFill>
+                  <a:schemeClr val="bg1">
+                    <a:lumMod val="85000"/>
+                  </a:schemeClr>
+                </a:solidFill>
+              </a:rPr>
+              <a:t>Auto</a:t>
+            </a:r>
           </a:p>
         </p:txBody>
       </p:sp>
@@ -3492,7 +3600,7 @@
 </p:sld>
 </file>
 
-<file path=ppt/slides/slide2.xml><?xml version="1.0" encoding="utf-8"?>
+<file path=ppt/slides/slide10.xml><?xml version="1.0" encoding="utf-8"?>
 <p:sld xmlns:a="http://schemas.openxmlformats.org/drawingml/2006/main" xmlns:r="http://schemas.openxmlformats.org/officeDocument/2006/relationships" xmlns:p="http://schemas.openxmlformats.org/presentationml/2006/main">
   <p:cSld>
     <p:spTree>
@@ -3514,7 +3622,7 @@
           <p:cNvPr id="2" name="Title 1">
             <a:extLst>
               <a:ext uri="{FF2B5EF4-FFF2-40B4-BE49-F238E27FC236}">
-                <a16:creationId xmlns:a16="http://schemas.microsoft.com/office/drawing/2014/main" id="{24FD93DA-CCD9-4B03-BCE7-5638F8DE1A57}"/>
+                <a16:creationId xmlns:a16="http://schemas.microsoft.com/office/drawing/2014/main" id="{7950071A-3299-4320-88E0-ACB40984E26A}"/>
               </a:ext>
             </a:extLst>
           </p:cNvPr>
@@ -3532,195 +3640,22 @@
           <a:p>
             <a:r>
               <a:rPr lang="en-GB" dirty="0"/>
-              <a:t>Downloading the program</a:t>
-            </a:r>
-          </a:p>
-        </p:txBody>
-      </p:sp>
-      <p:sp>
-        <p:nvSpPr>
-          <p:cNvPr id="3" name="Content Placeholder 2">
-            <a:extLst>
-              <a:ext uri="{FF2B5EF4-FFF2-40B4-BE49-F238E27FC236}">
-                <a16:creationId xmlns:a16="http://schemas.microsoft.com/office/drawing/2014/main" id="{4A0F47D6-FE4D-4390-AA14-B21BC7B7A5B7}"/>
-              </a:ext>
-            </a:extLst>
-          </p:cNvPr>
-          <p:cNvSpPr>
-            <a:spLocks noGrp="1"/>
-          </p:cNvSpPr>
-          <p:nvPr>
-            <p:ph idx="1"/>
-          </p:nvPr>
-        </p:nvSpPr>
-        <p:spPr/>
-        <p:txBody>
-          <a:bodyPr>
-            <a:normAutofit/>
-          </a:bodyPr>
-          <a:lstStyle/>
-          <a:p>
-            <a:pPr marL="514350" indent="-514350">
-              <a:buAutoNum type="arabicParenR"/>
-            </a:pPr>
-            <a:r>
-              <a:rPr lang="en-GB" sz="2400" dirty="0"/>
-              <a:t>Type into your browser: </a:t>
-            </a:r>
-            <a:r>
-              <a:rPr lang="en-GB" sz="2400" b="1" u="sng" dirty="0">
-                <a:solidFill>
-                  <a:srgbClr val="0070C0"/>
-                </a:solidFill>
-                <a:hlinkClick r:id="rId2"/>
-              </a:rPr>
-              <a:t>https://y11awards.page.link/download</a:t>
-            </a:r>
-            <a:endParaRPr lang="en-GB" sz="2400" b="1" u="sng" dirty="0">
-              <a:solidFill>
-                <a:srgbClr val="0070C0"/>
-              </a:solidFill>
-            </a:endParaRPr>
-          </a:p>
-          <a:p>
-            <a:pPr marL="514350" indent="-514350">
-              <a:buAutoNum type="arabicParenR"/>
-            </a:pPr>
-            <a:r>
-              <a:rPr lang="en-GB" sz="2400" dirty="0"/>
-              <a:t>The download should begin automatically</a:t>
-            </a:r>
-          </a:p>
-          <a:p>
-            <a:pPr marL="514350" indent="-514350">
-              <a:buAutoNum type="arabicParenR"/>
-            </a:pPr>
-            <a:r>
-              <a:rPr lang="en-GB" sz="2400" dirty="0"/>
-              <a:t>Run the file you just downloaded.</a:t>
-            </a:r>
-          </a:p>
-          <a:p>
-            <a:pPr marL="514350" indent="-514350">
-              <a:buAutoNum type="arabicParenR"/>
-            </a:pPr>
-            <a:endParaRPr lang="en-GB" sz="2400" dirty="0"/>
-          </a:p>
-          <a:p>
-            <a:pPr marL="0" indent="0" algn="ctr">
-              <a:buNone/>
-            </a:pPr>
-            <a:r>
-              <a:rPr lang="en-GB" sz="2400" b="1" u="sng" dirty="0"/>
-              <a:t>OR</a:t>
-            </a:r>
-          </a:p>
-          <a:p>
-            <a:pPr marL="457200" indent="-457200">
-              <a:buAutoNum type="arabicParenR"/>
-            </a:pPr>
-            <a:r>
-              <a:rPr lang="en-GB" sz="2400" dirty="0"/>
-              <a:t>Open the pupil drive at </a:t>
-            </a:r>
-            <a:r>
-              <a:rPr lang="en-GB" sz="2400" b="1" u="sng" dirty="0">
-                <a:solidFill>
-                  <a:srgbClr val="0070C0"/>
-                </a:solidFill>
-              </a:rPr>
-              <a:t>P:/Business and Computing/AwardsClient.exe</a:t>
-            </a:r>
-            <a:endParaRPr lang="en-GB" sz="2400" b="1" u="sng" dirty="0"/>
-          </a:p>
-          <a:p>
-            <a:pPr marL="457200" indent="-457200">
-              <a:buAutoNum type="arabicParenR"/>
-            </a:pPr>
-            <a:r>
-              <a:rPr lang="en-GB" sz="2400" dirty="0"/>
-              <a:t>Run that program</a:t>
-            </a:r>
-          </a:p>
-        </p:txBody>
-      </p:sp>
-    </p:spTree>
-    <p:extLst>
-      <p:ext uri="{BB962C8B-B14F-4D97-AF65-F5344CB8AC3E}">
-        <p14:creationId xmlns:p14="http://schemas.microsoft.com/office/powerpoint/2010/main" val="3780708407"/>
-      </p:ext>
-    </p:extLst>
-  </p:cSld>
-  <p:clrMapOvr>
-    <a:masterClrMapping/>
-  </p:clrMapOvr>
-  <mc:AlternateContent xmlns:mc="http://schemas.openxmlformats.org/markup-compatibility/2006">
-    <mc:Choice xmlns:p14="http://schemas.microsoft.com/office/powerpoint/2010/main" Requires="p14">
-      <p:transition spd="slow" p14:dur="2000" advTm="20000"/>
-    </mc:Choice>
-    <mc:Fallback>
-      <p:transition spd="slow" advTm="20000"/>
-    </mc:Fallback>
-  </mc:AlternateContent>
-</p:sld>
-</file>
-
-<file path=ppt/slides/slide3.xml><?xml version="1.0" encoding="utf-8"?>
-<p:sld xmlns:a="http://schemas.openxmlformats.org/drawingml/2006/main" xmlns:r="http://schemas.openxmlformats.org/officeDocument/2006/relationships" xmlns:p="http://schemas.openxmlformats.org/presentationml/2006/main">
-  <p:cSld>
-    <p:spTree>
-      <p:nvGrpSpPr>
-        <p:cNvPr id="1" name=""/>
-        <p:cNvGrpSpPr/>
-        <p:nvPr/>
-      </p:nvGrpSpPr>
-      <p:grpSpPr>
-        <a:xfrm>
-          <a:off x="0" y="0"/>
-          <a:ext cx="0" cy="0"/>
-          <a:chOff x="0" y="0"/>
-          <a:chExt cx="0" cy="0"/>
-        </a:xfrm>
-      </p:grpSpPr>
-      <p:sp>
-        <p:nvSpPr>
-          <p:cNvPr id="2" name="Title 1">
-            <a:extLst>
-              <a:ext uri="{FF2B5EF4-FFF2-40B4-BE49-F238E27FC236}">
-                <a16:creationId xmlns:a16="http://schemas.microsoft.com/office/drawing/2014/main" id="{39F252E7-5AC4-44BB-B752-21103BA7DB8F}"/>
-              </a:ext>
-            </a:extLst>
-          </p:cNvPr>
-          <p:cNvSpPr>
-            <a:spLocks noGrp="1"/>
-          </p:cNvSpPr>
-          <p:nvPr>
-            <p:ph type="title"/>
-          </p:nvPr>
-        </p:nvSpPr>
-        <p:spPr/>
-        <p:txBody>
-          <a:bodyPr/>
-          <a:lstStyle/>
-          <a:p>
-            <a:r>
-              <a:rPr lang="en-GB" dirty="0"/>
-              <a:t>Running the program</a:t>
+              <a:t>Confirming your votes</a:t>
             </a:r>
           </a:p>
         </p:txBody>
       </p:sp>
       <p:pic>
         <p:nvPicPr>
-          <p:cNvPr id="1026" name="Picture 2">
-            <a:extLst>
-              <a:ext uri="{FF2B5EF4-FFF2-40B4-BE49-F238E27FC236}">
-                <a16:creationId xmlns:a16="http://schemas.microsoft.com/office/drawing/2014/main" id="{E48D4DA3-73F5-4B36-8B5B-F6FE352E4CE2}"/>
+          <p:cNvPr id="6" name="Picture Placeholder 5">
+            <a:extLst>
+              <a:ext uri="{FF2B5EF4-FFF2-40B4-BE49-F238E27FC236}">
+                <a16:creationId xmlns:a16="http://schemas.microsoft.com/office/drawing/2014/main" id="{60CCDE29-A95E-403A-9392-646563640E31}"/>
               </a:ext>
             </a:extLst>
           </p:cNvPr>
           <p:cNvPicPr>
-            <a:picLocks noGrp="1" noChangeAspect="1" noChangeArrowheads="1"/>
+            <a:picLocks noGrp="1" noChangeAspect="1"/>
           </p:cNvPicPr>
           <p:nvPr>
             <p:ph type="pic" idx="1"/>
@@ -3738,24 +3673,11 @@
             <a:fillRect/>
           </a:stretch>
         </p:blipFill>
-        <p:spPr bwMode="auto">
+        <p:spPr>
           <a:xfrm>
-            <a:off x="5183188" y="1499781"/>
-            <a:ext cx="6172200" cy="3848912"/>
+            <a:off x="4772024" y="1112525"/>
+            <a:ext cx="7190199" cy="4483724"/>
           </a:xfrm>
-          <a:prstGeom prst="rect">
-            <a:avLst/>
-          </a:prstGeom>
-          <a:noFill/>
-          <a:extLst>
-            <a:ext uri="{909E8E84-426E-40DD-AFC4-6F175D3DCCD1}">
-              <a14:hiddenFill xmlns:a14="http://schemas.microsoft.com/office/drawing/2010/main">
-                <a:solidFill>
-                  <a:srgbClr val="FFFFFF"/>
-                </a:solidFill>
-              </a14:hiddenFill>
-            </a:ext>
-          </a:extLst>
         </p:spPr>
       </p:pic>
       <p:sp>
@@ -3763,7 +3685,7 @@
           <p:cNvPr id="4" name="Text Placeholder 3">
             <a:extLst>
               <a:ext uri="{FF2B5EF4-FFF2-40B4-BE49-F238E27FC236}">
-                <a16:creationId xmlns:a16="http://schemas.microsoft.com/office/drawing/2014/main" id="{4E1C25ED-C0B0-412D-BDA2-22D632DB89B1}"/>
+                <a16:creationId xmlns:a16="http://schemas.microsoft.com/office/drawing/2014/main" id="{8B0C147E-4089-4EBD-973C-23660C2605FF}"/>
               </a:ext>
             </a:extLst>
           </p:cNvPr>
@@ -3781,27 +3703,13 @@
           <a:p>
             <a:r>
               <a:rPr lang="en-GB" dirty="0"/>
-              <a:t>Once you have ran the program, you should find a view similar to that on the right.</a:t>
+              <a:t>You will need to check through each of the categories and ensure any names you have put (or not put) are correct.</a:t>
             </a:r>
           </a:p>
           <a:p>
             <a:r>
               <a:rPr lang="en-GB" dirty="0"/>
-              <a:t>Read the instructions, then when you are ready, click the button labelled </a:t>
-            </a:r>
-            <a:r>
-              <a:rPr lang="en-GB" b="1" dirty="0"/>
-              <a:t>I’m ready, lets begin</a:t>
-            </a:r>
-            <a:endParaRPr lang="en-GB" dirty="0"/>
-          </a:p>
-          <a:p>
-            <a:endParaRPr lang="en-GB" dirty="0"/>
-          </a:p>
-          <a:p>
-            <a:r>
-              <a:rPr lang="en-GB" dirty="0"/>
-              <a:t>If many people are voting, you may be placed in a Queue. You will have to wait until the people ahead of you have finished voting, then you will be allowed to start as above.</a:t>
+              <a:t>Then, hit the “Confirm” button.</a:t>
             </a:r>
           </a:p>
         </p:txBody>
@@ -3809,7 +3717,7 @@
     </p:spTree>
     <p:extLst>
       <p:ext uri="{BB962C8B-B14F-4D97-AF65-F5344CB8AC3E}">
-        <p14:creationId xmlns:p14="http://schemas.microsoft.com/office/powerpoint/2010/main" val="2621853128"/>
+        <p14:creationId xmlns:p14="http://schemas.microsoft.com/office/powerpoint/2010/main" val="2960078905"/>
       </p:ext>
     </p:extLst>
   </p:cSld>
@@ -3827,320 +3735,7 @@
 </p:sld>
 </file>
 
-<file path=ppt/slides/slide4.xml><?xml version="1.0" encoding="utf-8"?>
-<p:sld xmlns:a="http://schemas.openxmlformats.org/drawingml/2006/main" xmlns:r="http://schemas.openxmlformats.org/officeDocument/2006/relationships" xmlns:p="http://schemas.openxmlformats.org/presentationml/2006/main">
-  <p:cSld>
-    <p:spTree>
-      <p:nvGrpSpPr>
-        <p:cNvPr id="1" name=""/>
-        <p:cNvGrpSpPr/>
-        <p:nvPr/>
-      </p:nvGrpSpPr>
-      <p:grpSpPr>
-        <a:xfrm>
-          <a:off x="0" y="0"/>
-          <a:ext cx="0" cy="0"/>
-          <a:chOff x="0" y="0"/>
-          <a:chExt cx="0" cy="0"/>
-        </a:xfrm>
-      </p:grpSpPr>
-      <p:sp>
-        <p:nvSpPr>
-          <p:cNvPr id="6" name="Text Placeholder 5">
-            <a:extLst>
-              <a:ext uri="{FF2B5EF4-FFF2-40B4-BE49-F238E27FC236}">
-                <a16:creationId xmlns:a16="http://schemas.microsoft.com/office/drawing/2014/main" id="{244B8C56-60CE-492A-8B61-E03EC11B8C9A}"/>
-              </a:ext>
-            </a:extLst>
-          </p:cNvPr>
-          <p:cNvSpPr>
-            <a:spLocks noGrp="1"/>
-          </p:cNvSpPr>
-          <p:nvPr>
-            <p:ph type="body" sz="half" idx="2"/>
-          </p:nvPr>
-        </p:nvSpPr>
-        <p:spPr/>
-        <p:txBody>
-          <a:bodyPr/>
-          <a:lstStyle/>
-          <a:p>
-            <a:r>
-              <a:rPr lang="en-GB" dirty="0"/>
-              <a:t>For each of the categories, you will be presented with a view similar to the right.</a:t>
-            </a:r>
-          </a:p>
-          <a:p>
-            <a:r>
-              <a:rPr lang="en-GB" dirty="0"/>
-              <a:t>In the white text area, below “First choice” and “Second choice”, you will need to type the name of two people that you are voting for.</a:t>
-            </a:r>
-          </a:p>
-          <a:p>
-            <a:r>
-              <a:rPr lang="en-GB" b="1" dirty="0"/>
-              <a:t>You will need to click one of these names to lock that name into place</a:t>
-            </a:r>
-            <a:endParaRPr lang="en-GB" dirty="0"/>
-          </a:p>
-          <a:p>
-            <a:r>
-              <a:rPr lang="en-GB" dirty="0"/>
-              <a:t>You may also search by tutor group, last name, first name, etc. Note that the number of names you will see below is limited, so you may need to type more letters before you get the person you want.</a:t>
-            </a:r>
-          </a:p>
-        </p:txBody>
-      </p:sp>
-      <p:sp>
-        <p:nvSpPr>
-          <p:cNvPr id="8" name="Title 7">
-            <a:extLst>
-              <a:ext uri="{FF2B5EF4-FFF2-40B4-BE49-F238E27FC236}">
-                <a16:creationId xmlns:a16="http://schemas.microsoft.com/office/drawing/2014/main" id="{1E68D2C0-0889-4F92-BFF6-E81C3A82C78B}"/>
-              </a:ext>
-            </a:extLst>
-          </p:cNvPr>
-          <p:cNvSpPr>
-            <a:spLocks noGrp="1"/>
-          </p:cNvSpPr>
-          <p:nvPr>
-            <p:ph type="title"/>
-          </p:nvPr>
-        </p:nvSpPr>
-        <p:spPr/>
-        <p:txBody>
-          <a:bodyPr/>
-          <a:lstStyle/>
-          <a:p>
-            <a:r>
-              <a:rPr lang="en-GB" dirty="0"/>
-              <a:t>How to vote for people</a:t>
-            </a:r>
-          </a:p>
-        </p:txBody>
-      </p:sp>
-      <p:pic>
-        <p:nvPicPr>
-          <p:cNvPr id="14" name="Picture Placeholder 13">
-            <a:extLst>
-              <a:ext uri="{FF2B5EF4-FFF2-40B4-BE49-F238E27FC236}">
-                <a16:creationId xmlns:a16="http://schemas.microsoft.com/office/drawing/2014/main" id="{A1DD72BD-E332-48BD-9FCE-ABEA87D8C8FA}"/>
-              </a:ext>
-            </a:extLst>
-          </p:cNvPr>
-          <p:cNvPicPr>
-            <a:picLocks noGrp="1" noChangeAspect="1"/>
-          </p:cNvPicPr>
-          <p:nvPr>
-            <p:ph type="pic" idx="1"/>
-          </p:nvPr>
-        </p:nvPicPr>
-        <p:blipFill>
-          <a:blip r:embed="rId2">
-            <a:extLst>
-              <a:ext uri="{28A0092B-C50C-407E-A947-70E740481C1C}">
-                <a14:useLocalDpi xmlns:a14="http://schemas.microsoft.com/office/drawing/2010/main" val="0"/>
-              </a:ext>
-            </a:extLst>
-          </a:blip>
-          <a:stretch>
-            <a:fillRect/>
-          </a:stretch>
-        </p:blipFill>
-        <p:spPr>
-          <a:xfrm>
-            <a:off x="4876800" y="1143603"/>
-            <a:ext cx="7105800" cy="4431094"/>
-          </a:xfrm>
-        </p:spPr>
-      </p:pic>
-      <p:pic>
-        <p:nvPicPr>
-          <p:cNvPr id="3" name="Picture 2">
-            <a:extLst>
-              <a:ext uri="{FF2B5EF4-FFF2-40B4-BE49-F238E27FC236}">
-                <a16:creationId xmlns:a16="http://schemas.microsoft.com/office/drawing/2014/main" id="{C987D9B7-3696-4028-9999-5ACD40EF2A17}"/>
-              </a:ext>
-            </a:extLst>
-          </p:cNvPr>
-          <p:cNvPicPr>
-            <a:picLocks noChangeAspect="1"/>
-          </p:cNvPicPr>
-          <p:nvPr/>
-        </p:nvPicPr>
-        <p:blipFill>
-          <a:blip r:embed="rId3"/>
-          <a:stretch>
-            <a:fillRect/>
-          </a:stretch>
-        </p:blipFill>
-        <p:spPr>
-          <a:xfrm>
-            <a:off x="4876800" y="2149475"/>
-            <a:ext cx="2771775" cy="933450"/>
-          </a:xfrm>
-          <a:prstGeom prst="rect">
-            <a:avLst/>
-          </a:prstGeom>
-        </p:spPr>
-      </p:pic>
-    </p:spTree>
-    <p:extLst>
-      <p:ext uri="{BB962C8B-B14F-4D97-AF65-F5344CB8AC3E}">
-        <p14:creationId xmlns:p14="http://schemas.microsoft.com/office/powerpoint/2010/main" val="3287789034"/>
-      </p:ext>
-    </p:extLst>
-  </p:cSld>
-  <p:clrMapOvr>
-    <a:masterClrMapping/>
-  </p:clrMapOvr>
-  <mc:AlternateContent xmlns:mc="http://schemas.openxmlformats.org/markup-compatibility/2006" xmlns:p14="http://schemas.microsoft.com/office/powerpoint/2010/main">
-    <mc:Choice Requires="p14">
-      <p:transition spd="slow" p14:dur="2000" advTm="10000"/>
-    </mc:Choice>
-    <mc:Fallback xmlns="">
-      <p:transition spd="slow" advTm="10000"/>
-    </mc:Fallback>
-  </mc:AlternateContent>
-</p:sld>
-</file>
-
-<file path=ppt/slides/slide5.xml><?xml version="1.0" encoding="utf-8"?>
-<p:sld xmlns:a="http://schemas.openxmlformats.org/drawingml/2006/main" xmlns:r="http://schemas.openxmlformats.org/officeDocument/2006/relationships" xmlns:p="http://schemas.openxmlformats.org/presentationml/2006/main">
-  <p:cSld>
-    <p:spTree>
-      <p:nvGrpSpPr>
-        <p:cNvPr id="1" name=""/>
-        <p:cNvGrpSpPr/>
-        <p:nvPr/>
-      </p:nvGrpSpPr>
-      <p:grpSpPr>
-        <a:xfrm>
-          <a:off x="0" y="0"/>
-          <a:ext cx="0" cy="0"/>
-          <a:chOff x="0" y="0"/>
-          <a:chExt cx="0" cy="0"/>
-        </a:xfrm>
-      </p:grpSpPr>
-      <p:sp>
-        <p:nvSpPr>
-          <p:cNvPr id="2" name="Title 1">
-            <a:extLst>
-              <a:ext uri="{FF2B5EF4-FFF2-40B4-BE49-F238E27FC236}">
-                <a16:creationId xmlns:a16="http://schemas.microsoft.com/office/drawing/2014/main" id="{7950071A-3299-4320-88E0-ACB40984E26A}"/>
-              </a:ext>
-            </a:extLst>
-          </p:cNvPr>
-          <p:cNvSpPr>
-            <a:spLocks noGrp="1"/>
-          </p:cNvSpPr>
-          <p:nvPr>
-            <p:ph type="title"/>
-          </p:nvPr>
-        </p:nvSpPr>
-        <p:spPr/>
-        <p:txBody>
-          <a:bodyPr/>
-          <a:lstStyle/>
-          <a:p>
-            <a:r>
-              <a:rPr lang="en-GB" dirty="0"/>
-              <a:t>Confirming your votes</a:t>
-            </a:r>
-          </a:p>
-        </p:txBody>
-      </p:sp>
-      <p:pic>
-        <p:nvPicPr>
-          <p:cNvPr id="6" name="Picture Placeholder 5">
-            <a:extLst>
-              <a:ext uri="{FF2B5EF4-FFF2-40B4-BE49-F238E27FC236}">
-                <a16:creationId xmlns:a16="http://schemas.microsoft.com/office/drawing/2014/main" id="{60CCDE29-A95E-403A-9392-646563640E31}"/>
-              </a:ext>
-            </a:extLst>
-          </p:cNvPr>
-          <p:cNvPicPr>
-            <a:picLocks noGrp="1" noChangeAspect="1"/>
-          </p:cNvPicPr>
-          <p:nvPr>
-            <p:ph type="pic" idx="1"/>
-          </p:nvPr>
-        </p:nvPicPr>
-        <p:blipFill>
-          <a:blip r:embed="rId2">
-            <a:extLst>
-              <a:ext uri="{28A0092B-C50C-407E-A947-70E740481C1C}">
-                <a14:useLocalDpi xmlns:a14="http://schemas.microsoft.com/office/drawing/2010/main" val="0"/>
-              </a:ext>
-            </a:extLst>
-          </a:blip>
-          <a:stretch>
-            <a:fillRect/>
-          </a:stretch>
-        </p:blipFill>
-        <p:spPr>
-          <a:xfrm>
-            <a:off x="4772024" y="1112525"/>
-            <a:ext cx="7190199" cy="4483724"/>
-          </a:xfrm>
-        </p:spPr>
-      </p:pic>
-      <p:sp>
-        <p:nvSpPr>
-          <p:cNvPr id="4" name="Text Placeholder 3">
-            <a:extLst>
-              <a:ext uri="{FF2B5EF4-FFF2-40B4-BE49-F238E27FC236}">
-                <a16:creationId xmlns:a16="http://schemas.microsoft.com/office/drawing/2014/main" id="{8B0C147E-4089-4EBD-973C-23660C2605FF}"/>
-              </a:ext>
-            </a:extLst>
-          </p:cNvPr>
-          <p:cNvSpPr>
-            <a:spLocks noGrp="1"/>
-          </p:cNvSpPr>
-          <p:nvPr>
-            <p:ph type="body" sz="half" idx="2"/>
-          </p:nvPr>
-        </p:nvSpPr>
-        <p:spPr/>
-        <p:txBody>
-          <a:bodyPr/>
-          <a:lstStyle/>
-          <a:p>
-            <a:r>
-              <a:rPr lang="en-GB" dirty="0"/>
-              <a:t>You will need to check through each of the categories and ensure any names you have put (or not put) are correct.</a:t>
-            </a:r>
-          </a:p>
-          <a:p>
-            <a:r>
-              <a:rPr lang="en-GB" dirty="0"/>
-              <a:t>Then, hit the “Confirm” button.</a:t>
-            </a:r>
-          </a:p>
-        </p:txBody>
-      </p:sp>
-    </p:spTree>
-    <p:extLst>
-      <p:ext uri="{BB962C8B-B14F-4D97-AF65-F5344CB8AC3E}">
-        <p14:creationId xmlns:p14="http://schemas.microsoft.com/office/powerpoint/2010/main" val="4212165231"/>
-      </p:ext>
-    </p:extLst>
-  </p:cSld>
-  <p:clrMapOvr>
-    <a:masterClrMapping/>
-  </p:clrMapOvr>
-  <mc:AlternateContent xmlns:mc="http://schemas.openxmlformats.org/markup-compatibility/2006" xmlns:p14="http://schemas.microsoft.com/office/powerpoint/2010/main">
-    <mc:Choice Requires="p14">
-      <p:transition spd="slow" p14:dur="2000" advTm="10000"/>
-    </mc:Choice>
-    <mc:Fallback xmlns="">
-      <p:transition spd="slow" advTm="10000"/>
-    </mc:Fallback>
-  </mc:AlternateContent>
-</p:sld>
-</file>
-
-<file path=ppt/slides/slide6.xml><?xml version="1.0" encoding="utf-8"?>
+<file path=ppt/slides/slide11.xml><?xml version="1.0" encoding="utf-8"?>
 <p:sld xmlns:a="http://schemas.openxmlformats.org/drawingml/2006/main" xmlns:r="http://schemas.openxmlformats.org/officeDocument/2006/relationships" xmlns:p="http://schemas.openxmlformats.org/presentationml/2006/main">
   <p:cSld>
     <p:spTree>
@@ -4275,7 +3870,1607 @@
     </p:spTree>
     <p:extLst>
       <p:ext uri="{BB962C8B-B14F-4D97-AF65-F5344CB8AC3E}">
+        <p14:creationId xmlns:p14="http://schemas.microsoft.com/office/powerpoint/2010/main" val="1829676831"/>
+      </p:ext>
+    </p:extLst>
+  </p:cSld>
+  <p:clrMapOvr>
+    <a:masterClrMapping/>
+  </p:clrMapOvr>
+  <mc:AlternateContent xmlns:mc="http://schemas.openxmlformats.org/markup-compatibility/2006" xmlns:p14="http://schemas.microsoft.com/office/powerpoint/2010/main">
+    <mc:Choice Requires="p14">
+      <p:transition spd="slow" p14:dur="2000" advTm="10000"/>
+    </mc:Choice>
+    <mc:Fallback xmlns="">
+      <p:transition spd="slow" advTm="10000"/>
+    </mc:Fallback>
+  </mc:AlternateContent>
+</p:sld>
+</file>
+
+<file path=ppt/slides/slide2.xml><?xml version="1.0" encoding="utf-8"?>
+<p:sld xmlns:a="http://schemas.openxmlformats.org/drawingml/2006/main" xmlns:r="http://schemas.openxmlformats.org/officeDocument/2006/relationships" xmlns:p="http://schemas.openxmlformats.org/presentationml/2006/main">
+  <p:cSld>
+    <p:spTree>
+      <p:nvGrpSpPr>
+        <p:cNvPr id="1" name=""/>
+        <p:cNvGrpSpPr/>
+        <p:nvPr/>
+      </p:nvGrpSpPr>
+      <p:grpSpPr>
+        <a:xfrm>
+          <a:off x="0" y="0"/>
+          <a:ext cx="0" cy="0"/>
+          <a:chOff x="0" y="0"/>
+          <a:chExt cx="0" cy="0"/>
+        </a:xfrm>
+      </p:grpSpPr>
+      <p:sp>
+        <p:nvSpPr>
+          <p:cNvPr id="2" name="Title 1">
+            <a:extLst>
+              <a:ext uri="{FF2B5EF4-FFF2-40B4-BE49-F238E27FC236}">
+                <a16:creationId xmlns:a16="http://schemas.microsoft.com/office/drawing/2014/main" id="{24FD93DA-CCD9-4B03-BCE7-5638F8DE1A57}"/>
+              </a:ext>
+            </a:extLst>
+          </p:cNvPr>
+          <p:cNvSpPr>
+            <a:spLocks noGrp="1"/>
+          </p:cNvSpPr>
+          <p:nvPr>
+            <p:ph type="title"/>
+          </p:nvPr>
+        </p:nvSpPr>
+        <p:spPr/>
+        <p:txBody>
+          <a:bodyPr/>
+          <a:lstStyle/>
+          <a:p>
+            <a:r>
+              <a:rPr lang="en-GB" dirty="0"/>
+              <a:t>Downloading the program</a:t>
+            </a:r>
+          </a:p>
+        </p:txBody>
+      </p:sp>
+      <p:sp>
+        <p:nvSpPr>
+          <p:cNvPr id="3" name="Content Placeholder 2">
+            <a:extLst>
+              <a:ext uri="{FF2B5EF4-FFF2-40B4-BE49-F238E27FC236}">
+                <a16:creationId xmlns:a16="http://schemas.microsoft.com/office/drawing/2014/main" id="{4A0F47D6-FE4D-4390-AA14-B21BC7B7A5B7}"/>
+              </a:ext>
+            </a:extLst>
+          </p:cNvPr>
+          <p:cNvSpPr>
+            <a:spLocks noGrp="1"/>
+          </p:cNvSpPr>
+          <p:nvPr>
+            <p:ph idx="1"/>
+          </p:nvPr>
+        </p:nvSpPr>
+        <p:spPr/>
+        <p:txBody>
+          <a:bodyPr>
+            <a:normAutofit/>
+          </a:bodyPr>
+          <a:lstStyle/>
+          <a:p>
+            <a:pPr marL="514350" indent="-514350">
+              <a:buAutoNum type="arabicParenR"/>
+            </a:pPr>
+            <a:r>
+              <a:rPr lang="en-GB" sz="2400" dirty="0"/>
+              <a:t>Type into your browser: </a:t>
+            </a:r>
+            <a:r>
+              <a:rPr lang="en-GB" sz="2400" b="1" u="sng" dirty="0">
+                <a:solidFill>
+                  <a:srgbClr val="0070C0"/>
+                </a:solidFill>
+                <a:hlinkClick r:id="rId2"/>
+              </a:rPr>
+              <a:t>https://y11awards.page.link/download</a:t>
+            </a:r>
+            <a:endParaRPr lang="en-GB" sz="2400" b="1" u="sng" dirty="0">
+              <a:solidFill>
+                <a:srgbClr val="0070C0"/>
+              </a:solidFill>
+            </a:endParaRPr>
+          </a:p>
+          <a:p>
+            <a:pPr marL="514350" indent="-514350">
+              <a:buAutoNum type="arabicParenR"/>
+            </a:pPr>
+            <a:r>
+              <a:rPr lang="en-GB" sz="2400" dirty="0"/>
+              <a:t>The download should begin automatically</a:t>
+            </a:r>
+          </a:p>
+          <a:p>
+            <a:pPr marL="514350" indent="-514350">
+              <a:buAutoNum type="arabicParenR"/>
+            </a:pPr>
+            <a:r>
+              <a:rPr lang="en-GB" sz="2400" dirty="0"/>
+              <a:t>Run the file you just downloaded.</a:t>
+            </a:r>
+          </a:p>
+          <a:p>
+            <a:pPr marL="514350" indent="-514350">
+              <a:buAutoNum type="arabicParenR"/>
+            </a:pPr>
+            <a:endParaRPr lang="en-GB" sz="2400" dirty="0"/>
+          </a:p>
+          <a:p>
+            <a:pPr marL="0" indent="0" algn="ctr">
+              <a:buNone/>
+            </a:pPr>
+            <a:r>
+              <a:rPr lang="en-GB" sz="2400" b="1" u="sng" dirty="0"/>
+              <a:t>OR</a:t>
+            </a:r>
+          </a:p>
+          <a:p>
+            <a:pPr marL="457200" indent="-457200">
+              <a:buAutoNum type="arabicParenR"/>
+            </a:pPr>
+            <a:r>
+              <a:rPr lang="en-GB" sz="2400" dirty="0"/>
+              <a:t>Open the pupil drive at </a:t>
+            </a:r>
+            <a:r>
+              <a:rPr lang="en-GB" sz="2400" b="1" u="sng" dirty="0">
+                <a:solidFill>
+                  <a:srgbClr val="0070C0"/>
+                </a:solidFill>
+              </a:rPr>
+              <a:t>P:/Business and Computing/AwardsClient.exe</a:t>
+            </a:r>
+            <a:endParaRPr lang="en-GB" sz="2400" b="1" u="sng" dirty="0"/>
+          </a:p>
+          <a:p>
+            <a:pPr marL="457200" indent="-457200">
+              <a:buAutoNum type="arabicParenR"/>
+            </a:pPr>
+            <a:r>
+              <a:rPr lang="en-GB" sz="2400" dirty="0"/>
+              <a:t>Run that program</a:t>
+            </a:r>
+            <a:endParaRPr lang="en-GB" dirty="0"/>
+          </a:p>
+          <a:p>
+            <a:pPr marL="457200" indent="-457200">
+              <a:buAutoNum type="arabicParenR"/>
+            </a:pPr>
+            <a:r>
+              <a:rPr lang="en-GB" sz="2400" dirty="0"/>
+              <a:t>Note that the </a:t>
+            </a:r>
+            <a:r>
+              <a:rPr lang="en-GB" sz="2400" i="1" dirty="0"/>
+              <a:t>AwardsClient.exe</a:t>
+            </a:r>
+            <a:r>
+              <a:rPr lang="en-GB" sz="2400" dirty="0"/>
+              <a:t> may have a different, similar, name.</a:t>
+            </a:r>
+          </a:p>
+          <a:p>
+            <a:pPr marL="457200" indent="-457200">
+              <a:buAutoNum type="arabicParenR"/>
+            </a:pPr>
+            <a:endParaRPr lang="en-GB" sz="2400" dirty="0"/>
+          </a:p>
+        </p:txBody>
+      </p:sp>
+      <p:sp>
+        <p:nvSpPr>
+          <p:cNvPr id="4" name="Rectangle 3">
+            <a:hlinkClick r:id="" action="ppaction://customshow?id=0"/>
+            <a:extLst>
+              <a:ext uri="{FF2B5EF4-FFF2-40B4-BE49-F238E27FC236}">
+                <a16:creationId xmlns:a16="http://schemas.microsoft.com/office/drawing/2014/main" id="{7E329BC2-9D0C-4E09-900F-D8CAE431A747}"/>
+              </a:ext>
+            </a:extLst>
+          </p:cNvPr>
+          <p:cNvSpPr/>
+          <p:nvPr/>
+        </p:nvSpPr>
+        <p:spPr>
+          <a:xfrm>
+            <a:off x="11000792" y="0"/>
+            <a:ext cx="1191208" cy="531845"/>
+          </a:xfrm>
+          <a:prstGeom prst="rect">
+            <a:avLst/>
+          </a:prstGeom>
+          <a:noFill/>
+        </p:spPr>
+        <p:style>
+          <a:lnRef idx="2">
+            <a:schemeClr val="accent1">
+              <a:shade val="50000"/>
+            </a:schemeClr>
+          </a:lnRef>
+          <a:fillRef idx="1">
+            <a:schemeClr val="accent1"/>
+          </a:fillRef>
+          <a:effectRef idx="0">
+            <a:schemeClr val="accent1"/>
+          </a:effectRef>
+          <a:fontRef idx="minor">
+            <a:schemeClr val="lt1"/>
+          </a:fontRef>
+        </p:style>
+        <p:txBody>
+          <a:bodyPr rtlCol="0" anchor="ctr"/>
+          <a:lstStyle/>
+          <a:p>
+            <a:pPr algn="ctr"/>
+            <a:r>
+              <a:rPr lang="en-GB" dirty="0">
+                <a:solidFill>
+                  <a:schemeClr val="bg1">
+                    <a:lumMod val="85000"/>
+                  </a:schemeClr>
+                </a:solidFill>
+              </a:rPr>
+              <a:t>Auto</a:t>
+            </a:r>
+          </a:p>
+        </p:txBody>
+      </p:sp>
+    </p:spTree>
+    <p:extLst>
+      <p:ext uri="{BB962C8B-B14F-4D97-AF65-F5344CB8AC3E}">
+        <p14:creationId xmlns:p14="http://schemas.microsoft.com/office/powerpoint/2010/main" val="3780708407"/>
+      </p:ext>
+    </p:extLst>
+  </p:cSld>
+  <p:clrMapOvr>
+    <a:masterClrMapping/>
+  </p:clrMapOvr>
+</p:sld>
+</file>
+
+<file path=ppt/slides/slide3.xml><?xml version="1.0" encoding="utf-8"?>
+<p:sld xmlns:a="http://schemas.openxmlformats.org/drawingml/2006/main" xmlns:r="http://schemas.openxmlformats.org/officeDocument/2006/relationships" xmlns:p="http://schemas.openxmlformats.org/presentationml/2006/main">
+  <p:cSld>
+    <p:spTree>
+      <p:nvGrpSpPr>
+        <p:cNvPr id="1" name=""/>
+        <p:cNvGrpSpPr/>
+        <p:nvPr/>
+      </p:nvGrpSpPr>
+      <p:grpSpPr>
+        <a:xfrm>
+          <a:off x="0" y="0"/>
+          <a:ext cx="0" cy="0"/>
+          <a:chOff x="0" y="0"/>
+          <a:chExt cx="0" cy="0"/>
+        </a:xfrm>
+      </p:grpSpPr>
+      <p:sp>
+        <p:nvSpPr>
+          <p:cNvPr id="2" name="Title 1">
+            <a:extLst>
+              <a:ext uri="{FF2B5EF4-FFF2-40B4-BE49-F238E27FC236}">
+                <a16:creationId xmlns:a16="http://schemas.microsoft.com/office/drawing/2014/main" id="{39F252E7-5AC4-44BB-B752-21103BA7DB8F}"/>
+              </a:ext>
+            </a:extLst>
+          </p:cNvPr>
+          <p:cNvSpPr>
+            <a:spLocks noGrp="1"/>
+          </p:cNvSpPr>
+          <p:nvPr>
+            <p:ph type="title"/>
+          </p:nvPr>
+        </p:nvSpPr>
+        <p:spPr/>
+        <p:txBody>
+          <a:bodyPr/>
+          <a:lstStyle/>
+          <a:p>
+            <a:r>
+              <a:rPr lang="en-GB" dirty="0"/>
+              <a:t>Running the program</a:t>
+            </a:r>
+          </a:p>
+        </p:txBody>
+      </p:sp>
+      <p:pic>
+        <p:nvPicPr>
+          <p:cNvPr id="1026" name="Picture 2">
+            <a:extLst>
+              <a:ext uri="{FF2B5EF4-FFF2-40B4-BE49-F238E27FC236}">
+                <a16:creationId xmlns:a16="http://schemas.microsoft.com/office/drawing/2014/main" id="{E48D4DA3-73F5-4B36-8B5B-F6FE352E4CE2}"/>
+              </a:ext>
+            </a:extLst>
+          </p:cNvPr>
+          <p:cNvPicPr>
+            <a:picLocks noGrp="1" noChangeAspect="1" noChangeArrowheads="1"/>
+          </p:cNvPicPr>
+          <p:nvPr>
+            <p:ph type="pic" idx="1"/>
+          </p:nvPr>
+        </p:nvPicPr>
+        <p:blipFill>
+          <a:blip r:embed="rId2">
+            <a:extLst>
+              <a:ext uri="{28A0092B-C50C-407E-A947-70E740481C1C}">
+                <a14:useLocalDpi xmlns:a14="http://schemas.microsoft.com/office/drawing/2010/main" val="0"/>
+              </a:ext>
+            </a:extLst>
+          </a:blip>
+          <a:stretch>
+            <a:fillRect/>
+          </a:stretch>
+        </p:blipFill>
+        <p:spPr bwMode="auto">
+          <a:xfrm>
+            <a:off x="5183188" y="1499781"/>
+            <a:ext cx="6172200" cy="3848912"/>
+          </a:xfrm>
+          <a:prstGeom prst="rect">
+            <a:avLst/>
+          </a:prstGeom>
+          <a:noFill/>
+          <a:extLst>
+            <a:ext uri="{909E8E84-426E-40DD-AFC4-6F175D3DCCD1}">
+              <a14:hiddenFill xmlns:a14="http://schemas.microsoft.com/office/drawing/2010/main">
+                <a:solidFill>
+                  <a:srgbClr val="FFFFFF"/>
+                </a:solidFill>
+              </a14:hiddenFill>
+            </a:ext>
+          </a:extLst>
+        </p:spPr>
+      </p:pic>
+      <p:sp>
+        <p:nvSpPr>
+          <p:cNvPr id="4" name="Text Placeholder 3">
+            <a:extLst>
+              <a:ext uri="{FF2B5EF4-FFF2-40B4-BE49-F238E27FC236}">
+                <a16:creationId xmlns:a16="http://schemas.microsoft.com/office/drawing/2014/main" id="{4E1C25ED-C0B0-412D-BDA2-22D632DB89B1}"/>
+              </a:ext>
+            </a:extLst>
+          </p:cNvPr>
+          <p:cNvSpPr>
+            <a:spLocks noGrp="1"/>
+          </p:cNvSpPr>
+          <p:nvPr>
+            <p:ph type="body" sz="half" idx="2"/>
+          </p:nvPr>
+        </p:nvSpPr>
+        <p:spPr/>
+        <p:txBody>
+          <a:bodyPr/>
+          <a:lstStyle/>
+          <a:p>
+            <a:r>
+              <a:rPr lang="en-GB" dirty="0"/>
+              <a:t>Once you have ran the program, you should find a view similar to that on the right.</a:t>
+            </a:r>
+          </a:p>
+          <a:p>
+            <a:r>
+              <a:rPr lang="en-GB" dirty="0"/>
+              <a:t>Read the instructions, then when you are ready, click the button labelled </a:t>
+            </a:r>
+            <a:r>
+              <a:rPr lang="en-GB" b="1" dirty="0"/>
+              <a:t>I’m ready, lets begin</a:t>
+            </a:r>
+            <a:endParaRPr lang="en-GB" dirty="0"/>
+          </a:p>
+          <a:p>
+            <a:endParaRPr lang="en-GB" dirty="0"/>
+          </a:p>
+          <a:p>
+            <a:r>
+              <a:rPr lang="en-GB" dirty="0"/>
+              <a:t>If many people are voting, you may be placed in a Queue. You will have to wait until the people ahead of you have finished voting, then you will be allowed to start as above.</a:t>
+            </a:r>
+          </a:p>
+        </p:txBody>
+      </p:sp>
+      <p:sp>
+        <p:nvSpPr>
+          <p:cNvPr id="5" name="Rectangle 4">
+            <a:hlinkClick r:id="" action="ppaction://customshow?id=0"/>
+            <a:extLst>
+              <a:ext uri="{FF2B5EF4-FFF2-40B4-BE49-F238E27FC236}">
+                <a16:creationId xmlns:a16="http://schemas.microsoft.com/office/drawing/2014/main" id="{70A4EB8D-DC9C-47DC-A2B9-AC1B6001AD04}"/>
+              </a:ext>
+            </a:extLst>
+          </p:cNvPr>
+          <p:cNvSpPr/>
+          <p:nvPr/>
+        </p:nvSpPr>
+        <p:spPr>
+          <a:xfrm>
+            <a:off x="11000792" y="0"/>
+            <a:ext cx="1191208" cy="531845"/>
+          </a:xfrm>
+          <a:prstGeom prst="rect">
+            <a:avLst/>
+          </a:prstGeom>
+          <a:noFill/>
+        </p:spPr>
+        <p:style>
+          <a:lnRef idx="2">
+            <a:schemeClr val="accent1">
+              <a:shade val="50000"/>
+            </a:schemeClr>
+          </a:lnRef>
+          <a:fillRef idx="1">
+            <a:schemeClr val="accent1"/>
+          </a:fillRef>
+          <a:effectRef idx="0">
+            <a:schemeClr val="accent1"/>
+          </a:effectRef>
+          <a:fontRef idx="minor">
+            <a:schemeClr val="lt1"/>
+          </a:fontRef>
+        </p:style>
+        <p:txBody>
+          <a:bodyPr rtlCol="0" anchor="ctr"/>
+          <a:lstStyle/>
+          <a:p>
+            <a:pPr algn="ctr"/>
+            <a:r>
+              <a:rPr lang="en-GB" dirty="0">
+                <a:solidFill>
+                  <a:schemeClr val="bg1">
+                    <a:lumMod val="85000"/>
+                  </a:schemeClr>
+                </a:solidFill>
+              </a:rPr>
+              <a:t>Auto</a:t>
+            </a:r>
+          </a:p>
+        </p:txBody>
+      </p:sp>
+    </p:spTree>
+    <p:extLst>
+      <p:ext uri="{BB962C8B-B14F-4D97-AF65-F5344CB8AC3E}">
+        <p14:creationId xmlns:p14="http://schemas.microsoft.com/office/powerpoint/2010/main" val="2621853128"/>
+      </p:ext>
+    </p:extLst>
+  </p:cSld>
+  <p:clrMapOvr>
+    <a:masterClrMapping/>
+  </p:clrMapOvr>
+</p:sld>
+</file>
+
+<file path=ppt/slides/slide4.xml><?xml version="1.0" encoding="utf-8"?>
+<p:sld xmlns:a="http://schemas.openxmlformats.org/drawingml/2006/main" xmlns:r="http://schemas.openxmlformats.org/officeDocument/2006/relationships" xmlns:p="http://schemas.openxmlformats.org/presentationml/2006/main">
+  <p:cSld>
+    <p:spTree>
+      <p:nvGrpSpPr>
+        <p:cNvPr id="1" name=""/>
+        <p:cNvGrpSpPr/>
+        <p:nvPr/>
+      </p:nvGrpSpPr>
+      <p:grpSpPr>
+        <a:xfrm>
+          <a:off x="0" y="0"/>
+          <a:ext cx="0" cy="0"/>
+          <a:chOff x="0" y="0"/>
+          <a:chExt cx="0" cy="0"/>
+        </a:xfrm>
+      </p:grpSpPr>
+      <p:sp>
+        <p:nvSpPr>
+          <p:cNvPr id="6" name="Text Placeholder 5">
+            <a:extLst>
+              <a:ext uri="{FF2B5EF4-FFF2-40B4-BE49-F238E27FC236}">
+                <a16:creationId xmlns:a16="http://schemas.microsoft.com/office/drawing/2014/main" id="{244B8C56-60CE-492A-8B61-E03EC11B8C9A}"/>
+              </a:ext>
+            </a:extLst>
+          </p:cNvPr>
+          <p:cNvSpPr>
+            <a:spLocks noGrp="1"/>
+          </p:cNvSpPr>
+          <p:nvPr>
+            <p:ph type="body" sz="half" idx="2"/>
+          </p:nvPr>
+        </p:nvSpPr>
+        <p:spPr/>
+        <p:txBody>
+          <a:bodyPr/>
+          <a:lstStyle/>
+          <a:p>
+            <a:r>
+              <a:rPr lang="en-GB" dirty="0"/>
+              <a:t>For each of the categories, you will be presented with a view similar to the right.</a:t>
+            </a:r>
+          </a:p>
+          <a:p>
+            <a:r>
+              <a:rPr lang="en-GB" dirty="0"/>
+              <a:t>In the white text area, below “First choice” and “Second choice”, you will need to type the name of two people that you are voting for.</a:t>
+            </a:r>
+          </a:p>
+          <a:p>
+            <a:r>
+              <a:rPr lang="en-GB" b="1" dirty="0"/>
+              <a:t>You will need to click one of these names to lock that name into place</a:t>
+            </a:r>
+            <a:endParaRPr lang="en-GB" dirty="0"/>
+          </a:p>
+          <a:p>
+            <a:r>
+              <a:rPr lang="en-GB" dirty="0"/>
+              <a:t>You may also search by tutor group, last name, first name, etc. Note that the number of names you will see below is limited, so you may need to type more letters before you get the person you want.</a:t>
+            </a:r>
+          </a:p>
+        </p:txBody>
+      </p:sp>
+      <p:sp>
+        <p:nvSpPr>
+          <p:cNvPr id="8" name="Title 7">
+            <a:extLst>
+              <a:ext uri="{FF2B5EF4-FFF2-40B4-BE49-F238E27FC236}">
+                <a16:creationId xmlns:a16="http://schemas.microsoft.com/office/drawing/2014/main" id="{1E68D2C0-0889-4F92-BFF6-E81C3A82C78B}"/>
+              </a:ext>
+            </a:extLst>
+          </p:cNvPr>
+          <p:cNvSpPr>
+            <a:spLocks noGrp="1"/>
+          </p:cNvSpPr>
+          <p:nvPr>
+            <p:ph type="title"/>
+          </p:nvPr>
+        </p:nvSpPr>
+        <p:spPr/>
+        <p:txBody>
+          <a:bodyPr/>
+          <a:lstStyle/>
+          <a:p>
+            <a:r>
+              <a:rPr lang="en-GB" dirty="0"/>
+              <a:t>How to vote for people</a:t>
+            </a:r>
+          </a:p>
+        </p:txBody>
+      </p:sp>
+      <p:pic>
+        <p:nvPicPr>
+          <p:cNvPr id="14" name="Picture Placeholder 13">
+            <a:extLst>
+              <a:ext uri="{FF2B5EF4-FFF2-40B4-BE49-F238E27FC236}">
+                <a16:creationId xmlns:a16="http://schemas.microsoft.com/office/drawing/2014/main" id="{A1DD72BD-E332-48BD-9FCE-ABEA87D8C8FA}"/>
+              </a:ext>
+            </a:extLst>
+          </p:cNvPr>
+          <p:cNvPicPr>
+            <a:picLocks noGrp="1" noChangeAspect="1"/>
+          </p:cNvPicPr>
+          <p:nvPr>
+            <p:ph type="pic" idx="1"/>
+          </p:nvPr>
+        </p:nvPicPr>
+        <p:blipFill>
+          <a:blip r:embed="rId2">
+            <a:extLst>
+              <a:ext uri="{28A0092B-C50C-407E-A947-70E740481C1C}">
+                <a14:useLocalDpi xmlns:a14="http://schemas.microsoft.com/office/drawing/2010/main" val="0"/>
+              </a:ext>
+            </a:extLst>
+          </a:blip>
+          <a:stretch>
+            <a:fillRect/>
+          </a:stretch>
+        </p:blipFill>
+        <p:spPr>
+          <a:xfrm>
+            <a:off x="4876800" y="1143603"/>
+            <a:ext cx="7105800" cy="4431094"/>
+          </a:xfrm>
+        </p:spPr>
+      </p:pic>
+      <p:pic>
+        <p:nvPicPr>
+          <p:cNvPr id="3" name="Picture 2">
+            <a:extLst>
+              <a:ext uri="{FF2B5EF4-FFF2-40B4-BE49-F238E27FC236}">
+                <a16:creationId xmlns:a16="http://schemas.microsoft.com/office/drawing/2014/main" id="{C987D9B7-3696-4028-9999-5ACD40EF2A17}"/>
+              </a:ext>
+            </a:extLst>
+          </p:cNvPr>
+          <p:cNvPicPr>
+            <a:picLocks noChangeAspect="1"/>
+          </p:cNvPicPr>
+          <p:nvPr/>
+        </p:nvPicPr>
+        <p:blipFill>
+          <a:blip r:embed="rId3"/>
+          <a:stretch>
+            <a:fillRect/>
+          </a:stretch>
+        </p:blipFill>
+        <p:spPr>
+          <a:xfrm>
+            <a:off x="4876800" y="2149475"/>
+            <a:ext cx="2771775" cy="933450"/>
+          </a:xfrm>
+          <a:prstGeom prst="rect">
+            <a:avLst/>
+          </a:prstGeom>
+        </p:spPr>
+      </p:pic>
+      <p:sp>
+        <p:nvSpPr>
+          <p:cNvPr id="7" name="Rectangle 6">
+            <a:hlinkClick r:id="" action="ppaction://customshow?id=0"/>
+            <a:extLst>
+              <a:ext uri="{FF2B5EF4-FFF2-40B4-BE49-F238E27FC236}">
+                <a16:creationId xmlns:a16="http://schemas.microsoft.com/office/drawing/2014/main" id="{7230B7CB-F4A3-4080-AA71-5596AD06E853}"/>
+              </a:ext>
+            </a:extLst>
+          </p:cNvPr>
+          <p:cNvSpPr/>
+          <p:nvPr/>
+        </p:nvSpPr>
+        <p:spPr>
+          <a:xfrm>
+            <a:off x="11000792" y="0"/>
+            <a:ext cx="1191208" cy="531845"/>
+          </a:xfrm>
+          <a:prstGeom prst="rect">
+            <a:avLst/>
+          </a:prstGeom>
+          <a:noFill/>
+        </p:spPr>
+        <p:style>
+          <a:lnRef idx="2">
+            <a:schemeClr val="accent1">
+              <a:shade val="50000"/>
+            </a:schemeClr>
+          </a:lnRef>
+          <a:fillRef idx="1">
+            <a:schemeClr val="accent1"/>
+          </a:fillRef>
+          <a:effectRef idx="0">
+            <a:schemeClr val="accent1"/>
+          </a:effectRef>
+          <a:fontRef idx="minor">
+            <a:schemeClr val="lt1"/>
+          </a:fontRef>
+        </p:style>
+        <p:txBody>
+          <a:bodyPr rtlCol="0" anchor="ctr"/>
+          <a:lstStyle/>
+          <a:p>
+            <a:pPr algn="ctr"/>
+            <a:r>
+              <a:rPr lang="en-GB" dirty="0">
+                <a:solidFill>
+                  <a:schemeClr val="bg1">
+                    <a:lumMod val="85000"/>
+                  </a:schemeClr>
+                </a:solidFill>
+              </a:rPr>
+              <a:t>Auto</a:t>
+            </a:r>
+          </a:p>
+        </p:txBody>
+      </p:sp>
+    </p:spTree>
+    <p:extLst>
+      <p:ext uri="{BB962C8B-B14F-4D97-AF65-F5344CB8AC3E}">
+        <p14:creationId xmlns:p14="http://schemas.microsoft.com/office/powerpoint/2010/main" val="3287789034"/>
+      </p:ext>
+    </p:extLst>
+  </p:cSld>
+  <p:clrMapOvr>
+    <a:masterClrMapping/>
+  </p:clrMapOvr>
+</p:sld>
+</file>
+
+<file path=ppt/slides/slide5.xml><?xml version="1.0" encoding="utf-8"?>
+<p:sld xmlns:a="http://schemas.openxmlformats.org/drawingml/2006/main" xmlns:r="http://schemas.openxmlformats.org/officeDocument/2006/relationships" xmlns:p="http://schemas.openxmlformats.org/presentationml/2006/main">
+  <p:cSld>
+    <p:spTree>
+      <p:nvGrpSpPr>
+        <p:cNvPr id="1" name=""/>
+        <p:cNvGrpSpPr/>
+        <p:nvPr/>
+      </p:nvGrpSpPr>
+      <p:grpSpPr>
+        <a:xfrm>
+          <a:off x="0" y="0"/>
+          <a:ext cx="0" cy="0"/>
+          <a:chOff x="0" y="0"/>
+          <a:chExt cx="0" cy="0"/>
+        </a:xfrm>
+      </p:grpSpPr>
+      <p:sp>
+        <p:nvSpPr>
+          <p:cNvPr id="2" name="Title 1">
+            <a:extLst>
+              <a:ext uri="{FF2B5EF4-FFF2-40B4-BE49-F238E27FC236}">
+                <a16:creationId xmlns:a16="http://schemas.microsoft.com/office/drawing/2014/main" id="{7950071A-3299-4320-88E0-ACB40984E26A}"/>
+              </a:ext>
+            </a:extLst>
+          </p:cNvPr>
+          <p:cNvSpPr>
+            <a:spLocks noGrp="1"/>
+          </p:cNvSpPr>
+          <p:nvPr>
+            <p:ph type="title"/>
+          </p:nvPr>
+        </p:nvSpPr>
+        <p:spPr/>
+        <p:txBody>
+          <a:bodyPr/>
+          <a:lstStyle/>
+          <a:p>
+            <a:r>
+              <a:rPr lang="en-GB" dirty="0"/>
+              <a:t>Confirming your votes</a:t>
+            </a:r>
+          </a:p>
+        </p:txBody>
+      </p:sp>
+      <p:pic>
+        <p:nvPicPr>
+          <p:cNvPr id="6" name="Picture Placeholder 5">
+            <a:extLst>
+              <a:ext uri="{FF2B5EF4-FFF2-40B4-BE49-F238E27FC236}">
+                <a16:creationId xmlns:a16="http://schemas.microsoft.com/office/drawing/2014/main" id="{60CCDE29-A95E-403A-9392-646563640E31}"/>
+              </a:ext>
+            </a:extLst>
+          </p:cNvPr>
+          <p:cNvPicPr>
+            <a:picLocks noGrp="1" noChangeAspect="1"/>
+          </p:cNvPicPr>
+          <p:nvPr>
+            <p:ph type="pic" idx="1"/>
+          </p:nvPr>
+        </p:nvPicPr>
+        <p:blipFill>
+          <a:blip r:embed="rId2">
+            <a:extLst>
+              <a:ext uri="{28A0092B-C50C-407E-A947-70E740481C1C}">
+                <a14:useLocalDpi xmlns:a14="http://schemas.microsoft.com/office/drawing/2010/main" val="0"/>
+              </a:ext>
+            </a:extLst>
+          </a:blip>
+          <a:stretch>
+            <a:fillRect/>
+          </a:stretch>
+        </p:blipFill>
+        <p:spPr>
+          <a:xfrm>
+            <a:off x="4772024" y="1112525"/>
+            <a:ext cx="7190199" cy="4483724"/>
+          </a:xfrm>
+        </p:spPr>
+      </p:pic>
+      <p:sp>
+        <p:nvSpPr>
+          <p:cNvPr id="4" name="Text Placeholder 3">
+            <a:extLst>
+              <a:ext uri="{FF2B5EF4-FFF2-40B4-BE49-F238E27FC236}">
+                <a16:creationId xmlns:a16="http://schemas.microsoft.com/office/drawing/2014/main" id="{8B0C147E-4089-4EBD-973C-23660C2605FF}"/>
+              </a:ext>
+            </a:extLst>
+          </p:cNvPr>
+          <p:cNvSpPr>
+            <a:spLocks noGrp="1"/>
+          </p:cNvSpPr>
+          <p:nvPr>
+            <p:ph type="body" sz="half" idx="2"/>
+          </p:nvPr>
+        </p:nvSpPr>
+        <p:spPr/>
+        <p:txBody>
+          <a:bodyPr/>
+          <a:lstStyle/>
+          <a:p>
+            <a:r>
+              <a:rPr lang="en-GB" dirty="0"/>
+              <a:t>You will need to check through each of the categories and ensure any names you have put (or not put) are correct.</a:t>
+            </a:r>
+          </a:p>
+          <a:p>
+            <a:r>
+              <a:rPr lang="en-GB" dirty="0"/>
+              <a:t>Then, hit the “Confirm” button.</a:t>
+            </a:r>
+          </a:p>
+        </p:txBody>
+      </p:sp>
+      <p:sp>
+        <p:nvSpPr>
+          <p:cNvPr id="5" name="Rectangle 4">
+            <a:hlinkClick r:id="" action="ppaction://customshow?id=0"/>
+            <a:extLst>
+              <a:ext uri="{FF2B5EF4-FFF2-40B4-BE49-F238E27FC236}">
+                <a16:creationId xmlns:a16="http://schemas.microsoft.com/office/drawing/2014/main" id="{A6B65CF5-9606-4968-AEE2-ED5D7E14480D}"/>
+              </a:ext>
+            </a:extLst>
+          </p:cNvPr>
+          <p:cNvSpPr/>
+          <p:nvPr/>
+        </p:nvSpPr>
+        <p:spPr>
+          <a:xfrm>
+            <a:off x="11000792" y="0"/>
+            <a:ext cx="1191208" cy="531845"/>
+          </a:xfrm>
+          <a:prstGeom prst="rect">
+            <a:avLst/>
+          </a:prstGeom>
+          <a:noFill/>
+        </p:spPr>
+        <p:style>
+          <a:lnRef idx="2">
+            <a:schemeClr val="accent1">
+              <a:shade val="50000"/>
+            </a:schemeClr>
+          </a:lnRef>
+          <a:fillRef idx="1">
+            <a:schemeClr val="accent1"/>
+          </a:fillRef>
+          <a:effectRef idx="0">
+            <a:schemeClr val="accent1"/>
+          </a:effectRef>
+          <a:fontRef idx="minor">
+            <a:schemeClr val="lt1"/>
+          </a:fontRef>
+        </p:style>
+        <p:txBody>
+          <a:bodyPr rtlCol="0" anchor="ctr"/>
+          <a:lstStyle/>
+          <a:p>
+            <a:pPr algn="ctr"/>
+            <a:r>
+              <a:rPr lang="en-GB" dirty="0">
+                <a:solidFill>
+                  <a:schemeClr val="bg1">
+                    <a:lumMod val="85000"/>
+                  </a:schemeClr>
+                </a:solidFill>
+              </a:rPr>
+              <a:t>Auto</a:t>
+            </a:r>
+          </a:p>
+        </p:txBody>
+      </p:sp>
+    </p:spTree>
+    <p:extLst>
+      <p:ext uri="{BB962C8B-B14F-4D97-AF65-F5344CB8AC3E}">
+        <p14:creationId xmlns:p14="http://schemas.microsoft.com/office/powerpoint/2010/main" val="4212165231"/>
+      </p:ext>
+    </p:extLst>
+  </p:cSld>
+  <p:clrMapOvr>
+    <a:masterClrMapping/>
+  </p:clrMapOvr>
+</p:sld>
+</file>
+
+<file path=ppt/slides/slide6.xml><?xml version="1.0" encoding="utf-8"?>
+<p:sld xmlns:a="http://schemas.openxmlformats.org/drawingml/2006/main" xmlns:r="http://schemas.openxmlformats.org/officeDocument/2006/relationships" xmlns:p="http://schemas.openxmlformats.org/presentationml/2006/main">
+  <p:cSld>
+    <p:spTree>
+      <p:nvGrpSpPr>
+        <p:cNvPr id="1" name=""/>
+        <p:cNvGrpSpPr/>
+        <p:nvPr/>
+      </p:nvGrpSpPr>
+      <p:grpSpPr>
+        <a:xfrm>
+          <a:off x="0" y="0"/>
+          <a:ext cx="0" cy="0"/>
+          <a:chOff x="0" y="0"/>
+          <a:chExt cx="0" cy="0"/>
+        </a:xfrm>
+      </p:grpSpPr>
+      <p:sp>
+        <p:nvSpPr>
+          <p:cNvPr id="2" name="Title 1">
+            <a:extLst>
+              <a:ext uri="{FF2B5EF4-FFF2-40B4-BE49-F238E27FC236}">
+                <a16:creationId xmlns:a16="http://schemas.microsoft.com/office/drawing/2014/main" id="{591BB388-5ADB-47F2-AF0C-465EE736F6CB}"/>
+              </a:ext>
+            </a:extLst>
+          </p:cNvPr>
+          <p:cNvSpPr>
+            <a:spLocks noGrp="1"/>
+          </p:cNvSpPr>
+          <p:nvPr>
+            <p:ph type="title"/>
+          </p:nvPr>
+        </p:nvSpPr>
+        <p:spPr>
+          <a:xfrm>
+            <a:off x="839788" y="457200"/>
+            <a:ext cx="3932237" cy="1600200"/>
+          </a:xfrm>
+        </p:spPr>
+        <p:txBody>
+          <a:bodyPr/>
+          <a:lstStyle/>
+          <a:p>
+            <a:r>
+              <a:rPr lang="en-GB" dirty="0"/>
+              <a:t>Finished voting</a:t>
+            </a:r>
+          </a:p>
+        </p:txBody>
+      </p:sp>
+      <p:sp>
+        <p:nvSpPr>
+          <p:cNvPr id="4" name="Text Placeholder 3">
+            <a:extLst>
+              <a:ext uri="{FF2B5EF4-FFF2-40B4-BE49-F238E27FC236}">
+                <a16:creationId xmlns:a16="http://schemas.microsoft.com/office/drawing/2014/main" id="{36822B0A-232F-4AEA-BD1E-25F27FF74762}"/>
+              </a:ext>
+            </a:extLst>
+          </p:cNvPr>
+          <p:cNvSpPr>
+            <a:spLocks noGrp="1"/>
+          </p:cNvSpPr>
+          <p:nvPr>
+            <p:ph type="body" sz="half" idx="2"/>
+          </p:nvPr>
+        </p:nvSpPr>
+        <p:spPr/>
+        <p:txBody>
+          <a:bodyPr/>
+          <a:lstStyle/>
+          <a:p>
+            <a:r>
+              <a:rPr lang="en-GB" dirty="0"/>
+              <a:t>Once you have confirmed your vote, you should be presented with a screen as on the left.</a:t>
+            </a:r>
+          </a:p>
+          <a:p>
+            <a:r>
+              <a:rPr lang="en-GB" b="1" dirty="0"/>
+              <a:t>You are then able to close the program and log-off the computer.</a:t>
+            </a:r>
+          </a:p>
+        </p:txBody>
+      </p:sp>
+      <p:pic>
+        <p:nvPicPr>
+          <p:cNvPr id="3076" name="Picture 4">
+            <a:extLst>
+              <a:ext uri="{FF2B5EF4-FFF2-40B4-BE49-F238E27FC236}">
+                <a16:creationId xmlns:a16="http://schemas.microsoft.com/office/drawing/2014/main" id="{9B127A42-F601-4244-8366-14CC0615C3A5}"/>
+              </a:ext>
+            </a:extLst>
+          </p:cNvPr>
+          <p:cNvPicPr>
+            <a:picLocks noGrp="1" noChangeAspect="1" noChangeArrowheads="1"/>
+          </p:cNvPicPr>
+          <p:nvPr>
+            <p:ph type="pic" idx="1"/>
+          </p:nvPr>
+        </p:nvPicPr>
+        <p:blipFill>
+          <a:blip r:embed="rId2">
+            <a:extLst>
+              <a:ext uri="{28A0092B-C50C-407E-A947-70E740481C1C}">
+                <a14:useLocalDpi xmlns:a14="http://schemas.microsoft.com/office/drawing/2010/main" val="0"/>
+              </a:ext>
+            </a:extLst>
+          </a:blip>
+          <a:stretch>
+            <a:fillRect/>
+          </a:stretch>
+        </p:blipFill>
+        <p:spPr bwMode="auto">
+          <a:xfrm>
+            <a:off x="5553111" y="2057400"/>
+            <a:ext cx="5848283" cy="1244600"/>
+          </a:xfrm>
+          <a:prstGeom prst="rect">
+            <a:avLst/>
+          </a:prstGeom>
+          <a:noFill/>
+          <a:extLst>
+            <a:ext uri="{909E8E84-426E-40DD-AFC4-6F175D3DCCD1}">
+              <a14:hiddenFill xmlns:a14="http://schemas.microsoft.com/office/drawing/2010/main">
+                <a:solidFill>
+                  <a:srgbClr val="FFFFFF"/>
+                </a:solidFill>
+              </a14:hiddenFill>
+            </a:ext>
+          </a:extLst>
+        </p:spPr>
+      </p:pic>
+      <p:sp>
+        <p:nvSpPr>
+          <p:cNvPr id="5" name="Rectangle 4">
+            <a:hlinkClick r:id="" action="ppaction://customshow?id=0"/>
+            <a:extLst>
+              <a:ext uri="{FF2B5EF4-FFF2-40B4-BE49-F238E27FC236}">
+                <a16:creationId xmlns:a16="http://schemas.microsoft.com/office/drawing/2014/main" id="{A0BAB6E7-AAD6-4010-9EF6-9DE014F1E4D9}"/>
+              </a:ext>
+            </a:extLst>
+          </p:cNvPr>
+          <p:cNvSpPr/>
+          <p:nvPr/>
+        </p:nvSpPr>
+        <p:spPr>
+          <a:xfrm>
+            <a:off x="11000792" y="0"/>
+            <a:ext cx="1191208" cy="531845"/>
+          </a:xfrm>
+          <a:prstGeom prst="rect">
+            <a:avLst/>
+          </a:prstGeom>
+          <a:noFill/>
+        </p:spPr>
+        <p:style>
+          <a:lnRef idx="2">
+            <a:schemeClr val="accent1">
+              <a:shade val="50000"/>
+            </a:schemeClr>
+          </a:lnRef>
+          <a:fillRef idx="1">
+            <a:schemeClr val="accent1"/>
+          </a:fillRef>
+          <a:effectRef idx="0">
+            <a:schemeClr val="accent1"/>
+          </a:effectRef>
+          <a:fontRef idx="minor">
+            <a:schemeClr val="lt1"/>
+          </a:fontRef>
+        </p:style>
+        <p:txBody>
+          <a:bodyPr rtlCol="0" anchor="ctr"/>
+          <a:lstStyle/>
+          <a:p>
+            <a:pPr algn="ctr"/>
+            <a:r>
+              <a:rPr lang="en-GB" dirty="0">
+                <a:solidFill>
+                  <a:schemeClr val="bg1">
+                    <a:lumMod val="85000"/>
+                  </a:schemeClr>
+                </a:solidFill>
+              </a:rPr>
+              <a:t>Auto</a:t>
+            </a:r>
+          </a:p>
+        </p:txBody>
+      </p:sp>
+    </p:spTree>
+    <p:extLst>
+      <p:ext uri="{BB962C8B-B14F-4D97-AF65-F5344CB8AC3E}">
         <p14:creationId xmlns:p14="http://schemas.microsoft.com/office/powerpoint/2010/main" val="3907237546"/>
+      </p:ext>
+    </p:extLst>
+  </p:cSld>
+  <p:clrMapOvr>
+    <a:masterClrMapping/>
+  </p:clrMapOvr>
+</p:sld>
+</file>
+
+<file path=ppt/slides/slide7.xml><?xml version="1.0" encoding="utf-8"?>
+<p:sld xmlns:a="http://schemas.openxmlformats.org/drawingml/2006/main" xmlns:r="http://schemas.openxmlformats.org/officeDocument/2006/relationships" xmlns:p="http://schemas.openxmlformats.org/presentationml/2006/main">
+  <p:cSld>
+    <p:spTree>
+      <p:nvGrpSpPr>
+        <p:cNvPr id="1" name=""/>
+        <p:cNvGrpSpPr/>
+        <p:nvPr/>
+      </p:nvGrpSpPr>
+      <p:grpSpPr>
+        <a:xfrm>
+          <a:off x="0" y="0"/>
+          <a:ext cx="0" cy="0"/>
+          <a:chOff x="0" y="0"/>
+          <a:chExt cx="0" cy="0"/>
+        </a:xfrm>
+      </p:grpSpPr>
+      <p:sp>
+        <p:nvSpPr>
+          <p:cNvPr id="2" name="Title 1">
+            <a:extLst>
+              <a:ext uri="{FF2B5EF4-FFF2-40B4-BE49-F238E27FC236}">
+                <a16:creationId xmlns:a16="http://schemas.microsoft.com/office/drawing/2014/main" id="{24FD93DA-CCD9-4B03-BCE7-5638F8DE1A57}"/>
+              </a:ext>
+            </a:extLst>
+          </p:cNvPr>
+          <p:cNvSpPr>
+            <a:spLocks noGrp="1"/>
+          </p:cNvSpPr>
+          <p:nvPr>
+            <p:ph type="title"/>
+          </p:nvPr>
+        </p:nvSpPr>
+        <p:spPr/>
+        <p:txBody>
+          <a:bodyPr/>
+          <a:lstStyle/>
+          <a:p>
+            <a:r>
+              <a:rPr lang="en-GB" dirty="0"/>
+              <a:t>Downloading the program</a:t>
+            </a:r>
+          </a:p>
+        </p:txBody>
+      </p:sp>
+      <p:sp>
+        <p:nvSpPr>
+          <p:cNvPr id="3" name="Content Placeholder 2">
+            <a:extLst>
+              <a:ext uri="{FF2B5EF4-FFF2-40B4-BE49-F238E27FC236}">
+                <a16:creationId xmlns:a16="http://schemas.microsoft.com/office/drawing/2014/main" id="{4A0F47D6-FE4D-4390-AA14-B21BC7B7A5B7}"/>
+              </a:ext>
+            </a:extLst>
+          </p:cNvPr>
+          <p:cNvSpPr>
+            <a:spLocks noGrp="1"/>
+          </p:cNvSpPr>
+          <p:nvPr>
+            <p:ph idx="1"/>
+          </p:nvPr>
+        </p:nvSpPr>
+        <p:spPr/>
+        <p:txBody>
+          <a:bodyPr>
+            <a:normAutofit/>
+          </a:bodyPr>
+          <a:lstStyle/>
+          <a:p>
+            <a:pPr marL="514350" indent="-514350">
+              <a:buAutoNum type="arabicParenR"/>
+            </a:pPr>
+            <a:r>
+              <a:rPr lang="en-GB" sz="2400" dirty="0"/>
+              <a:t>Type into your browser: </a:t>
+            </a:r>
+            <a:r>
+              <a:rPr lang="en-GB" sz="2400" b="1" u="sng" dirty="0">
+                <a:solidFill>
+                  <a:srgbClr val="0070C0"/>
+                </a:solidFill>
+                <a:hlinkClick r:id="rId2"/>
+              </a:rPr>
+              <a:t>https://y11awards.page.link/download</a:t>
+            </a:r>
+            <a:endParaRPr lang="en-GB" sz="2400" b="1" u="sng" dirty="0">
+              <a:solidFill>
+                <a:srgbClr val="0070C0"/>
+              </a:solidFill>
+            </a:endParaRPr>
+          </a:p>
+          <a:p>
+            <a:pPr marL="514350" indent="-514350">
+              <a:buAutoNum type="arabicParenR"/>
+            </a:pPr>
+            <a:r>
+              <a:rPr lang="en-GB" sz="2400" dirty="0"/>
+              <a:t>The download should begin automatically</a:t>
+            </a:r>
+          </a:p>
+          <a:p>
+            <a:pPr marL="514350" indent="-514350">
+              <a:buAutoNum type="arabicParenR"/>
+            </a:pPr>
+            <a:r>
+              <a:rPr lang="en-GB" sz="2400" dirty="0"/>
+              <a:t>Run the file you just downloaded.</a:t>
+            </a:r>
+          </a:p>
+          <a:p>
+            <a:pPr marL="514350" indent="-514350">
+              <a:buAutoNum type="arabicParenR"/>
+            </a:pPr>
+            <a:endParaRPr lang="en-GB" sz="2400" dirty="0"/>
+          </a:p>
+          <a:p>
+            <a:pPr marL="0" indent="0" algn="ctr">
+              <a:buNone/>
+            </a:pPr>
+            <a:r>
+              <a:rPr lang="en-GB" sz="2400" b="1" u="sng" dirty="0"/>
+              <a:t>OR</a:t>
+            </a:r>
+          </a:p>
+          <a:p>
+            <a:pPr marL="457200" indent="-457200">
+              <a:buAutoNum type="arabicParenR"/>
+            </a:pPr>
+            <a:r>
+              <a:rPr lang="en-GB" sz="2400" dirty="0"/>
+              <a:t>Open the pupil drive at </a:t>
+            </a:r>
+            <a:r>
+              <a:rPr lang="en-GB" sz="2400" b="1" u="sng" dirty="0">
+                <a:solidFill>
+                  <a:srgbClr val="0070C0"/>
+                </a:solidFill>
+              </a:rPr>
+              <a:t>P:/Business and Computing/AwardsClient.exe</a:t>
+            </a:r>
+            <a:endParaRPr lang="en-GB" sz="2400" b="1" u="sng" dirty="0"/>
+          </a:p>
+          <a:p>
+            <a:pPr marL="457200" indent="-457200">
+              <a:buAutoNum type="arabicParenR"/>
+            </a:pPr>
+            <a:r>
+              <a:rPr lang="en-GB" sz="2400" dirty="0"/>
+              <a:t>Run that program</a:t>
+            </a:r>
+          </a:p>
+          <a:p>
+            <a:pPr marL="457200" indent="-457200">
+              <a:buAutoNum type="arabicParenR"/>
+            </a:pPr>
+            <a:r>
+              <a:rPr lang="en-GB" sz="2000" dirty="0"/>
+              <a:t>Note that the </a:t>
+            </a:r>
+            <a:r>
+              <a:rPr lang="en-GB" sz="2000" i="1" dirty="0"/>
+              <a:t>AwardsClient.exe</a:t>
+            </a:r>
+            <a:r>
+              <a:rPr lang="en-GB" sz="2000" dirty="0"/>
+              <a:t> may have a different, similar, name.</a:t>
+            </a:r>
+          </a:p>
+        </p:txBody>
+      </p:sp>
+    </p:spTree>
+    <p:extLst>
+      <p:ext uri="{BB962C8B-B14F-4D97-AF65-F5344CB8AC3E}">
+        <p14:creationId xmlns:p14="http://schemas.microsoft.com/office/powerpoint/2010/main" val="591608587"/>
+      </p:ext>
+    </p:extLst>
+  </p:cSld>
+  <p:clrMapOvr>
+    <a:masterClrMapping/>
+  </p:clrMapOvr>
+  <mc:AlternateContent xmlns:mc="http://schemas.openxmlformats.org/markup-compatibility/2006">
+    <mc:Choice xmlns:p14="http://schemas.microsoft.com/office/powerpoint/2010/main" Requires="p14">
+      <p:transition spd="slow" p14:dur="2000" advTm="10000"/>
+    </mc:Choice>
+    <mc:Fallback>
+      <p:transition spd="slow" advTm="10000"/>
+    </mc:Fallback>
+  </mc:AlternateContent>
+</p:sld>
+</file>
+
+<file path=ppt/slides/slide8.xml><?xml version="1.0" encoding="utf-8"?>
+<p:sld xmlns:a="http://schemas.openxmlformats.org/drawingml/2006/main" xmlns:r="http://schemas.openxmlformats.org/officeDocument/2006/relationships" xmlns:p="http://schemas.openxmlformats.org/presentationml/2006/main">
+  <p:cSld>
+    <p:spTree>
+      <p:nvGrpSpPr>
+        <p:cNvPr id="1" name=""/>
+        <p:cNvGrpSpPr/>
+        <p:nvPr/>
+      </p:nvGrpSpPr>
+      <p:grpSpPr>
+        <a:xfrm>
+          <a:off x="0" y="0"/>
+          <a:ext cx="0" cy="0"/>
+          <a:chOff x="0" y="0"/>
+          <a:chExt cx="0" cy="0"/>
+        </a:xfrm>
+      </p:grpSpPr>
+      <p:sp>
+        <p:nvSpPr>
+          <p:cNvPr id="2" name="Title 1">
+            <a:extLst>
+              <a:ext uri="{FF2B5EF4-FFF2-40B4-BE49-F238E27FC236}">
+                <a16:creationId xmlns:a16="http://schemas.microsoft.com/office/drawing/2014/main" id="{39F252E7-5AC4-44BB-B752-21103BA7DB8F}"/>
+              </a:ext>
+            </a:extLst>
+          </p:cNvPr>
+          <p:cNvSpPr>
+            <a:spLocks noGrp="1"/>
+          </p:cNvSpPr>
+          <p:nvPr>
+            <p:ph type="title"/>
+          </p:nvPr>
+        </p:nvSpPr>
+        <p:spPr/>
+        <p:txBody>
+          <a:bodyPr/>
+          <a:lstStyle/>
+          <a:p>
+            <a:r>
+              <a:rPr lang="en-GB" dirty="0"/>
+              <a:t>Running the program</a:t>
+            </a:r>
+          </a:p>
+        </p:txBody>
+      </p:sp>
+      <p:pic>
+        <p:nvPicPr>
+          <p:cNvPr id="1026" name="Picture 2">
+            <a:extLst>
+              <a:ext uri="{FF2B5EF4-FFF2-40B4-BE49-F238E27FC236}">
+                <a16:creationId xmlns:a16="http://schemas.microsoft.com/office/drawing/2014/main" id="{E48D4DA3-73F5-4B36-8B5B-F6FE352E4CE2}"/>
+              </a:ext>
+            </a:extLst>
+          </p:cNvPr>
+          <p:cNvPicPr>
+            <a:picLocks noGrp="1" noChangeAspect="1" noChangeArrowheads="1"/>
+          </p:cNvPicPr>
+          <p:nvPr>
+            <p:ph type="pic" idx="1"/>
+          </p:nvPr>
+        </p:nvPicPr>
+        <p:blipFill>
+          <a:blip r:embed="rId2">
+            <a:extLst>
+              <a:ext uri="{28A0092B-C50C-407E-A947-70E740481C1C}">
+                <a14:useLocalDpi xmlns:a14="http://schemas.microsoft.com/office/drawing/2010/main" val="0"/>
+              </a:ext>
+            </a:extLst>
+          </a:blip>
+          <a:stretch>
+            <a:fillRect/>
+          </a:stretch>
+        </p:blipFill>
+        <p:spPr bwMode="auto">
+          <a:xfrm>
+            <a:off x="5183188" y="1499781"/>
+            <a:ext cx="6172200" cy="3848912"/>
+          </a:xfrm>
+          <a:prstGeom prst="rect">
+            <a:avLst/>
+          </a:prstGeom>
+          <a:noFill/>
+          <a:extLst>
+            <a:ext uri="{909E8E84-426E-40DD-AFC4-6F175D3DCCD1}">
+              <a14:hiddenFill xmlns:a14="http://schemas.microsoft.com/office/drawing/2010/main">
+                <a:solidFill>
+                  <a:srgbClr val="FFFFFF"/>
+                </a:solidFill>
+              </a14:hiddenFill>
+            </a:ext>
+          </a:extLst>
+        </p:spPr>
+      </p:pic>
+      <p:sp>
+        <p:nvSpPr>
+          <p:cNvPr id="4" name="Text Placeholder 3">
+            <a:extLst>
+              <a:ext uri="{FF2B5EF4-FFF2-40B4-BE49-F238E27FC236}">
+                <a16:creationId xmlns:a16="http://schemas.microsoft.com/office/drawing/2014/main" id="{4E1C25ED-C0B0-412D-BDA2-22D632DB89B1}"/>
+              </a:ext>
+            </a:extLst>
+          </p:cNvPr>
+          <p:cNvSpPr>
+            <a:spLocks noGrp="1"/>
+          </p:cNvSpPr>
+          <p:nvPr>
+            <p:ph type="body" sz="half" idx="2"/>
+          </p:nvPr>
+        </p:nvSpPr>
+        <p:spPr/>
+        <p:txBody>
+          <a:bodyPr/>
+          <a:lstStyle/>
+          <a:p>
+            <a:r>
+              <a:rPr lang="en-GB" dirty="0"/>
+              <a:t>Once you have ran the program, you should find a view similar to that on the right.</a:t>
+            </a:r>
+          </a:p>
+          <a:p>
+            <a:r>
+              <a:rPr lang="en-GB" dirty="0"/>
+              <a:t>Read the instructions, then when you are ready, click the button labelled </a:t>
+            </a:r>
+            <a:r>
+              <a:rPr lang="en-GB" b="1" dirty="0"/>
+              <a:t>I’m ready, lets begin</a:t>
+            </a:r>
+            <a:endParaRPr lang="en-GB" dirty="0"/>
+          </a:p>
+          <a:p>
+            <a:endParaRPr lang="en-GB" dirty="0"/>
+          </a:p>
+          <a:p>
+            <a:r>
+              <a:rPr lang="en-GB" dirty="0"/>
+              <a:t>If many people are voting, you may be placed in a Queue. You will have to wait until the people ahead of you have finished voting, then you will be allowed to start as above.</a:t>
+            </a:r>
+          </a:p>
+        </p:txBody>
+      </p:sp>
+    </p:spTree>
+    <p:extLst>
+      <p:ext uri="{BB962C8B-B14F-4D97-AF65-F5344CB8AC3E}">
+        <p14:creationId xmlns:p14="http://schemas.microsoft.com/office/powerpoint/2010/main" val="921140066"/>
+      </p:ext>
+    </p:extLst>
+  </p:cSld>
+  <p:clrMapOvr>
+    <a:masterClrMapping/>
+  </p:clrMapOvr>
+  <mc:AlternateContent xmlns:mc="http://schemas.openxmlformats.org/markup-compatibility/2006">
+    <mc:Choice xmlns:p14="http://schemas.microsoft.com/office/powerpoint/2010/main" Requires="p14">
+      <p:transition spd="slow" p14:dur="2000" advTm="10000"/>
+    </mc:Choice>
+    <mc:Fallback>
+      <p:transition spd="slow" advTm="10000"/>
+    </mc:Fallback>
+  </mc:AlternateContent>
+</p:sld>
+</file>
+
+<file path=ppt/slides/slide9.xml><?xml version="1.0" encoding="utf-8"?>
+<p:sld xmlns:a="http://schemas.openxmlformats.org/drawingml/2006/main" xmlns:r="http://schemas.openxmlformats.org/officeDocument/2006/relationships" xmlns:p="http://schemas.openxmlformats.org/presentationml/2006/main">
+  <p:cSld>
+    <p:spTree>
+      <p:nvGrpSpPr>
+        <p:cNvPr id="1" name=""/>
+        <p:cNvGrpSpPr/>
+        <p:nvPr/>
+      </p:nvGrpSpPr>
+      <p:grpSpPr>
+        <a:xfrm>
+          <a:off x="0" y="0"/>
+          <a:ext cx="0" cy="0"/>
+          <a:chOff x="0" y="0"/>
+          <a:chExt cx="0" cy="0"/>
+        </a:xfrm>
+      </p:grpSpPr>
+      <p:sp>
+        <p:nvSpPr>
+          <p:cNvPr id="6" name="Text Placeholder 5">
+            <a:extLst>
+              <a:ext uri="{FF2B5EF4-FFF2-40B4-BE49-F238E27FC236}">
+                <a16:creationId xmlns:a16="http://schemas.microsoft.com/office/drawing/2014/main" id="{244B8C56-60CE-492A-8B61-E03EC11B8C9A}"/>
+              </a:ext>
+            </a:extLst>
+          </p:cNvPr>
+          <p:cNvSpPr>
+            <a:spLocks noGrp="1"/>
+          </p:cNvSpPr>
+          <p:nvPr>
+            <p:ph type="body" sz="half" idx="2"/>
+          </p:nvPr>
+        </p:nvSpPr>
+        <p:spPr/>
+        <p:txBody>
+          <a:bodyPr/>
+          <a:lstStyle/>
+          <a:p>
+            <a:r>
+              <a:rPr lang="en-GB" dirty="0"/>
+              <a:t>For each of the categories, you will be presented with a view similar to the right.</a:t>
+            </a:r>
+          </a:p>
+          <a:p>
+            <a:r>
+              <a:rPr lang="en-GB" dirty="0"/>
+              <a:t>In the white text area, below “First choice” and “Second choice”, you will need to type the name of two people that you are voting for.</a:t>
+            </a:r>
+          </a:p>
+          <a:p>
+            <a:r>
+              <a:rPr lang="en-GB" b="1" dirty="0"/>
+              <a:t>You will need to click one of these names to lock that name into place</a:t>
+            </a:r>
+            <a:endParaRPr lang="en-GB" dirty="0"/>
+          </a:p>
+          <a:p>
+            <a:r>
+              <a:rPr lang="en-GB" dirty="0"/>
+              <a:t>You may also search by tutor group, last name, first name, etc. Note that the number of names you will see below is limited, so you may need to type more letters before you get the person you want.</a:t>
+            </a:r>
+          </a:p>
+        </p:txBody>
+      </p:sp>
+      <p:sp>
+        <p:nvSpPr>
+          <p:cNvPr id="8" name="Title 7">
+            <a:extLst>
+              <a:ext uri="{FF2B5EF4-FFF2-40B4-BE49-F238E27FC236}">
+                <a16:creationId xmlns:a16="http://schemas.microsoft.com/office/drawing/2014/main" id="{1E68D2C0-0889-4F92-BFF6-E81C3A82C78B}"/>
+              </a:ext>
+            </a:extLst>
+          </p:cNvPr>
+          <p:cNvSpPr>
+            <a:spLocks noGrp="1"/>
+          </p:cNvSpPr>
+          <p:nvPr>
+            <p:ph type="title"/>
+          </p:nvPr>
+        </p:nvSpPr>
+        <p:spPr/>
+        <p:txBody>
+          <a:bodyPr/>
+          <a:lstStyle/>
+          <a:p>
+            <a:r>
+              <a:rPr lang="en-GB" dirty="0"/>
+              <a:t>How to vote for people</a:t>
+            </a:r>
+          </a:p>
+        </p:txBody>
+      </p:sp>
+      <p:pic>
+        <p:nvPicPr>
+          <p:cNvPr id="14" name="Picture Placeholder 13">
+            <a:extLst>
+              <a:ext uri="{FF2B5EF4-FFF2-40B4-BE49-F238E27FC236}">
+                <a16:creationId xmlns:a16="http://schemas.microsoft.com/office/drawing/2014/main" id="{A1DD72BD-E332-48BD-9FCE-ABEA87D8C8FA}"/>
+              </a:ext>
+            </a:extLst>
+          </p:cNvPr>
+          <p:cNvPicPr>
+            <a:picLocks noGrp="1" noChangeAspect="1"/>
+          </p:cNvPicPr>
+          <p:nvPr>
+            <p:ph type="pic" idx="1"/>
+          </p:nvPr>
+        </p:nvPicPr>
+        <p:blipFill>
+          <a:blip r:embed="rId2">
+            <a:extLst>
+              <a:ext uri="{28A0092B-C50C-407E-A947-70E740481C1C}">
+                <a14:useLocalDpi xmlns:a14="http://schemas.microsoft.com/office/drawing/2010/main" val="0"/>
+              </a:ext>
+            </a:extLst>
+          </a:blip>
+          <a:stretch>
+            <a:fillRect/>
+          </a:stretch>
+        </p:blipFill>
+        <p:spPr>
+          <a:xfrm>
+            <a:off x="4876800" y="1143603"/>
+            <a:ext cx="7105800" cy="4431094"/>
+          </a:xfrm>
+        </p:spPr>
+      </p:pic>
+      <p:pic>
+        <p:nvPicPr>
+          <p:cNvPr id="3" name="Picture 2">
+            <a:extLst>
+              <a:ext uri="{FF2B5EF4-FFF2-40B4-BE49-F238E27FC236}">
+                <a16:creationId xmlns:a16="http://schemas.microsoft.com/office/drawing/2014/main" id="{C987D9B7-3696-4028-9999-5ACD40EF2A17}"/>
+              </a:ext>
+            </a:extLst>
+          </p:cNvPr>
+          <p:cNvPicPr>
+            <a:picLocks noChangeAspect="1"/>
+          </p:cNvPicPr>
+          <p:nvPr/>
+        </p:nvPicPr>
+        <p:blipFill>
+          <a:blip r:embed="rId3"/>
+          <a:stretch>
+            <a:fillRect/>
+          </a:stretch>
+        </p:blipFill>
+        <p:spPr>
+          <a:xfrm>
+            <a:off x="4876800" y="2149475"/>
+            <a:ext cx="2771775" cy="933450"/>
+          </a:xfrm>
+          <a:prstGeom prst="rect">
+            <a:avLst/>
+          </a:prstGeom>
+        </p:spPr>
+      </p:pic>
+    </p:spTree>
+    <p:extLst>
+      <p:ext uri="{BB962C8B-B14F-4D97-AF65-F5344CB8AC3E}">
+        <p14:creationId xmlns:p14="http://schemas.microsoft.com/office/powerpoint/2010/main" val="199657525"/>
       </p:ext>
     </p:extLst>
   </p:cSld>

</xml_diff>

<commit_message>
Improvements done to powerpoint
As per suggestions given by Sir, powerpoint has unneeded info removed and the important bits enlarged / highlighted.
</commit_message>
<xml_diff>
--- a/TestPPT.pptx
+++ b/TestPPT.pptx
@@ -156,6 +156,7 @@
       </p:ext>
     </p:extLst>
   </p:cmAuthor>
+  <p:cmAuthor id="2" name="Dan Thomson" initials="" lastIdx="0" clrIdx="1"/>
 </p:cmAuthorLst>
 </file>
 
@@ -344,7 +345,7 @@
           <a:p>
             <a:fld id="{2DE974FE-8FBB-4500-9ED5-FAB5F5087E28}" type="datetimeFigureOut">
               <a:rPr lang="en-GB" smtClean="0"/>
-              <a:t>29/12/2018</a:t>
+              <a:t>05/01/2019</a:t>
             </a:fld>
             <a:endParaRPr lang="en-GB"/>
           </a:p>
@@ -544,7 +545,7 @@
           <a:p>
             <a:fld id="{2DE974FE-8FBB-4500-9ED5-FAB5F5087E28}" type="datetimeFigureOut">
               <a:rPr lang="en-GB" smtClean="0"/>
-              <a:t>29/12/2018</a:t>
+              <a:t>05/01/2019</a:t>
             </a:fld>
             <a:endParaRPr lang="en-GB"/>
           </a:p>
@@ -754,7 +755,7 @@
           <a:p>
             <a:fld id="{2DE974FE-8FBB-4500-9ED5-FAB5F5087E28}" type="datetimeFigureOut">
               <a:rPr lang="en-GB" smtClean="0"/>
-              <a:t>29/12/2018</a:t>
+              <a:t>05/01/2019</a:t>
             </a:fld>
             <a:endParaRPr lang="en-GB"/>
           </a:p>
@@ -954,7 +955,7 @@
           <a:p>
             <a:fld id="{2DE974FE-8FBB-4500-9ED5-FAB5F5087E28}" type="datetimeFigureOut">
               <a:rPr lang="en-GB" smtClean="0"/>
-              <a:t>29/12/2018</a:t>
+              <a:t>05/01/2019</a:t>
             </a:fld>
             <a:endParaRPr lang="en-GB"/>
           </a:p>
@@ -1230,7 +1231,7 @@
           <a:p>
             <a:fld id="{2DE974FE-8FBB-4500-9ED5-FAB5F5087E28}" type="datetimeFigureOut">
               <a:rPr lang="en-GB" smtClean="0"/>
-              <a:t>29/12/2018</a:t>
+              <a:t>05/01/2019</a:t>
             </a:fld>
             <a:endParaRPr lang="en-GB"/>
           </a:p>
@@ -1498,7 +1499,7 @@
           <a:p>
             <a:fld id="{2DE974FE-8FBB-4500-9ED5-FAB5F5087E28}" type="datetimeFigureOut">
               <a:rPr lang="en-GB" smtClean="0"/>
-              <a:t>29/12/2018</a:t>
+              <a:t>05/01/2019</a:t>
             </a:fld>
             <a:endParaRPr lang="en-GB"/>
           </a:p>
@@ -1913,7 +1914,7 @@
           <a:p>
             <a:fld id="{2DE974FE-8FBB-4500-9ED5-FAB5F5087E28}" type="datetimeFigureOut">
               <a:rPr lang="en-GB" smtClean="0"/>
-              <a:t>29/12/2018</a:t>
+              <a:t>05/01/2019</a:t>
             </a:fld>
             <a:endParaRPr lang="en-GB"/>
           </a:p>
@@ -2055,7 +2056,7 @@
           <a:p>
             <a:fld id="{2DE974FE-8FBB-4500-9ED5-FAB5F5087E28}" type="datetimeFigureOut">
               <a:rPr lang="en-GB" smtClean="0"/>
-              <a:t>29/12/2018</a:t>
+              <a:t>05/01/2019</a:t>
             </a:fld>
             <a:endParaRPr lang="en-GB"/>
           </a:p>
@@ -2168,7 +2169,7 @@
           <a:p>
             <a:fld id="{2DE974FE-8FBB-4500-9ED5-FAB5F5087E28}" type="datetimeFigureOut">
               <a:rPr lang="en-GB" smtClean="0"/>
-              <a:t>29/12/2018</a:t>
+              <a:t>05/01/2019</a:t>
             </a:fld>
             <a:endParaRPr lang="en-GB"/>
           </a:p>
@@ -2481,7 +2482,7 @@
           <a:p>
             <a:fld id="{2DE974FE-8FBB-4500-9ED5-FAB5F5087E28}" type="datetimeFigureOut">
               <a:rPr lang="en-GB" smtClean="0"/>
-              <a:t>29/12/2018</a:t>
+              <a:t>05/01/2019</a:t>
             </a:fld>
             <a:endParaRPr lang="en-GB"/>
           </a:p>
@@ -2770,7 +2771,7 @@
           <a:p>
             <a:fld id="{2DE974FE-8FBB-4500-9ED5-FAB5F5087E28}" type="datetimeFigureOut">
               <a:rPr lang="en-GB" smtClean="0"/>
-              <a:t>29/12/2018</a:t>
+              <a:t>05/01/2019</a:t>
             </a:fld>
             <a:endParaRPr lang="en-GB"/>
           </a:p>
@@ -3013,7 +3014,7 @@
           <a:p>
             <a:fld id="{2DE974FE-8FBB-4500-9ED5-FAB5F5087E28}" type="datetimeFigureOut">
               <a:rPr lang="en-GB" smtClean="0"/>
-              <a:t>29/12/2018</a:t>
+              <a:t>05/01/2019</a:t>
             </a:fld>
             <a:endParaRPr lang="en-GB"/>
           </a:p>
@@ -3633,14 +3634,19 @@
             <p:ph type="title"/>
           </p:nvPr>
         </p:nvSpPr>
-        <p:spPr/>
+        <p:spPr>
+          <a:xfrm>
+            <a:off x="3400108" y="457200"/>
+            <a:ext cx="3932237" cy="531812"/>
+          </a:xfrm>
+        </p:spPr>
         <p:txBody>
           <a:bodyPr/>
           <a:lstStyle/>
           <a:p>
             <a:r>
               <a:rPr lang="en-GB" dirty="0"/>
-              <a:t>Confirming your votes</a:t>
+              <a:t>Confirm your votes</a:t>
             </a:r>
           </a:p>
         </p:txBody>
@@ -3682,34 +3688,159 @@
       </p:pic>
       <p:sp>
         <p:nvSpPr>
-          <p:cNvPr id="4" name="Text Placeholder 3">
-            <a:extLst>
-              <a:ext uri="{FF2B5EF4-FFF2-40B4-BE49-F238E27FC236}">
-                <a16:creationId xmlns:a16="http://schemas.microsoft.com/office/drawing/2014/main" id="{8B0C147E-4089-4EBD-973C-23660C2605FF}"/>
-              </a:ext>
-            </a:extLst>
-          </p:cNvPr>
-          <p:cNvSpPr>
-            <a:spLocks noGrp="1"/>
-          </p:cNvSpPr>
-          <p:nvPr>
-            <p:ph type="body" sz="half" idx="2"/>
-          </p:nvPr>
-        </p:nvSpPr>
-        <p:spPr/>
-        <p:txBody>
-          <a:bodyPr/>
-          <a:lstStyle/>
-          <a:p>
+          <p:cNvPr id="8" name="Speech Bubble: Rectangle with Corners Rounded 7">
+            <a:extLst>
+              <a:ext uri="{FF2B5EF4-FFF2-40B4-BE49-F238E27FC236}">
+                <a16:creationId xmlns:a16="http://schemas.microsoft.com/office/drawing/2014/main" id="{91E6280D-99B7-4D21-8D28-2962E3D9BE34}"/>
+              </a:ext>
+            </a:extLst>
+          </p:cNvPr>
+          <p:cNvSpPr/>
+          <p:nvPr/>
+        </p:nvSpPr>
+        <p:spPr>
+          <a:xfrm>
+            <a:off x="518160" y="1112525"/>
+            <a:ext cx="2987040" cy="868675"/>
+          </a:xfrm>
+          <a:prstGeom prst="wedgeRoundRectCallout">
+            <a:avLst>
+              <a:gd name="adj1" fmla="val 90577"/>
+              <a:gd name="adj2" fmla="val 30921"/>
+              <a:gd name="adj3" fmla="val 16667"/>
+            </a:avLst>
+          </a:prstGeom>
+        </p:spPr>
+        <p:style>
+          <a:lnRef idx="2">
+            <a:schemeClr val="accent1">
+              <a:shade val="50000"/>
+            </a:schemeClr>
+          </a:lnRef>
+          <a:fillRef idx="1">
+            <a:schemeClr val="accent1"/>
+          </a:fillRef>
+          <a:effectRef idx="0">
+            <a:schemeClr val="accent1"/>
+          </a:effectRef>
+          <a:fontRef idx="minor">
+            <a:schemeClr val="lt1"/>
+          </a:fontRef>
+        </p:style>
+        <p:txBody>
+          <a:bodyPr rtlCol="0" anchor="ctr"/>
+          <a:lstStyle/>
+          <a:p>
+            <a:pPr algn="ctr"/>
             <a:r>
               <a:rPr lang="en-GB" dirty="0"/>
-              <a:t>You will need to check through each of the categories and ensure any names you have put (or not put) are correct.</a:t>
-            </a:r>
-          </a:p>
-          <a:p>
+              <a:t>Check that your votes are correct</a:t>
+            </a:r>
+          </a:p>
+        </p:txBody>
+      </p:sp>
+      <p:sp>
+        <p:nvSpPr>
+          <p:cNvPr id="9" name="Speech Bubble: Rectangle with Corners Rounded 8">
+            <a:extLst>
+              <a:ext uri="{FF2B5EF4-FFF2-40B4-BE49-F238E27FC236}">
+                <a16:creationId xmlns:a16="http://schemas.microsoft.com/office/drawing/2014/main" id="{D8EE1151-F2B6-4A5C-A383-6FE509998849}"/>
+              </a:ext>
+            </a:extLst>
+          </p:cNvPr>
+          <p:cNvSpPr/>
+          <p:nvPr/>
+        </p:nvSpPr>
+        <p:spPr>
+          <a:xfrm>
+            <a:off x="518160" y="2260605"/>
+            <a:ext cx="2987040" cy="868675"/>
+          </a:xfrm>
+          <a:prstGeom prst="wedgeRoundRectCallout">
+            <a:avLst>
+              <a:gd name="adj1" fmla="val 95339"/>
+              <a:gd name="adj2" fmla="val 137354"/>
+              <a:gd name="adj3" fmla="val 16667"/>
+            </a:avLst>
+          </a:prstGeom>
+        </p:spPr>
+        <p:style>
+          <a:lnRef idx="2">
+            <a:schemeClr val="accent1">
+              <a:shade val="50000"/>
+            </a:schemeClr>
+          </a:lnRef>
+          <a:fillRef idx="1">
+            <a:schemeClr val="accent1"/>
+          </a:fillRef>
+          <a:effectRef idx="0">
+            <a:schemeClr val="accent1"/>
+          </a:effectRef>
+          <a:fontRef idx="minor">
+            <a:schemeClr val="lt1"/>
+          </a:fontRef>
+        </p:style>
+        <p:txBody>
+          <a:bodyPr rtlCol="0" anchor="ctr"/>
+          <a:lstStyle/>
+          <a:p>
+            <a:pPr algn="ctr"/>
             <a:r>
               <a:rPr lang="en-GB" dirty="0"/>
-              <a:t>Then, hit the “Confirm” button.</a:t>
+              <a:t>If they are, hit Confirm to submit them</a:t>
+            </a:r>
+          </a:p>
+        </p:txBody>
+      </p:sp>
+      <p:sp>
+        <p:nvSpPr>
+          <p:cNvPr id="10" name="Speech Bubble: Rectangle with Corners Rounded 9">
+            <a:extLst>
+              <a:ext uri="{FF2B5EF4-FFF2-40B4-BE49-F238E27FC236}">
+                <a16:creationId xmlns:a16="http://schemas.microsoft.com/office/drawing/2014/main" id="{36EBBEB3-5401-4C72-BC58-917B11C62FD5}"/>
+              </a:ext>
+            </a:extLst>
+          </p:cNvPr>
+          <p:cNvSpPr/>
+          <p:nvPr/>
+        </p:nvSpPr>
+        <p:spPr>
+          <a:xfrm>
+            <a:off x="518160" y="3728721"/>
+            <a:ext cx="2987040" cy="2016754"/>
+          </a:xfrm>
+          <a:prstGeom prst="wedgeRoundRectCallout">
+            <a:avLst>
+              <a:gd name="adj1" fmla="val 97040"/>
+              <a:gd name="adj2" fmla="val 32568"/>
+              <a:gd name="adj3" fmla="val 16667"/>
+            </a:avLst>
+          </a:prstGeom>
+        </p:spPr>
+        <p:style>
+          <a:lnRef idx="2">
+            <a:schemeClr val="accent1">
+              <a:shade val="50000"/>
+            </a:schemeClr>
+          </a:lnRef>
+          <a:fillRef idx="1">
+            <a:schemeClr val="accent1"/>
+          </a:fillRef>
+          <a:effectRef idx="0">
+            <a:schemeClr val="accent1"/>
+          </a:effectRef>
+          <a:fontRef idx="minor">
+            <a:schemeClr val="lt1"/>
+          </a:fontRef>
+        </p:style>
+        <p:txBody>
+          <a:bodyPr rtlCol="0" anchor="ctr"/>
+          <a:lstStyle/>
+          <a:p>
+            <a:pPr algn="ctr"/>
+            <a:r>
+              <a:rPr lang="en-GB" dirty="0"/>
+              <a:t>If not, click “Back” and then use the “Previous” button to go back and re-do your votes.</a:t>
             </a:r>
           </a:p>
         </p:txBody>
@@ -3717,18 +3848,18 @@
     </p:spTree>
     <p:extLst>
       <p:ext uri="{BB962C8B-B14F-4D97-AF65-F5344CB8AC3E}">
-        <p14:creationId xmlns:p14="http://schemas.microsoft.com/office/powerpoint/2010/main" val="2960078905"/>
+        <p14:creationId xmlns:p14="http://schemas.microsoft.com/office/powerpoint/2010/main" val="3576356832"/>
       </p:ext>
     </p:extLst>
   </p:cSld>
   <p:clrMapOvr>
     <a:masterClrMapping/>
   </p:clrMapOvr>
-  <mc:AlternateContent xmlns:mc="http://schemas.openxmlformats.org/markup-compatibility/2006" xmlns:p14="http://schemas.microsoft.com/office/powerpoint/2010/main">
-    <mc:Choice Requires="p14">
+  <mc:AlternateContent xmlns:mc="http://schemas.openxmlformats.org/markup-compatibility/2006">
+    <mc:Choice xmlns:p14="http://schemas.microsoft.com/office/powerpoint/2010/main" Requires="p14">
       <p:transition spd="slow" p14:dur="2000" advTm="10000"/>
     </mc:Choice>
-    <mc:Fallback xmlns="">
+    <mc:Fallback>
       <p:transition spd="slow" advTm="10000"/>
     </mc:Fallback>
   </mc:AlternateContent>
@@ -3813,7 +3944,7 @@
           </a:p>
           <a:p>
             <a:r>
-              <a:rPr lang="en-GB" b="1" dirty="0"/>
+              <a:rPr lang="en-GB" sz="2000" b="1" dirty="0"/>
               <a:t>You are then able to close the program and log-off the computer.</a:t>
             </a:r>
           </a:p>
@@ -3870,18 +4001,18 @@
     </p:spTree>
     <p:extLst>
       <p:ext uri="{BB962C8B-B14F-4D97-AF65-F5344CB8AC3E}">
-        <p14:creationId xmlns:p14="http://schemas.microsoft.com/office/powerpoint/2010/main" val="1829676831"/>
+        <p14:creationId xmlns:p14="http://schemas.microsoft.com/office/powerpoint/2010/main" val="2996598433"/>
       </p:ext>
     </p:extLst>
   </p:cSld>
   <p:clrMapOvr>
     <a:masterClrMapping/>
   </p:clrMapOvr>
-  <mc:AlternateContent xmlns:mc="http://schemas.openxmlformats.org/markup-compatibility/2006" xmlns:p14="http://schemas.microsoft.com/office/powerpoint/2010/main">
-    <mc:Choice Requires="p14">
+  <mc:AlternateContent xmlns:mc="http://schemas.openxmlformats.org/markup-compatibility/2006">
+    <mc:Choice xmlns:p14="http://schemas.microsoft.com/office/powerpoint/2010/main" Requires="p14">
       <p:transition spd="slow" p14:dur="2000" advTm="10000"/>
     </mc:Choice>
-    <mc:Fallback xmlns="">
+    <mc:Fallback>
       <p:transition spd="slow" advTm="10000"/>
     </mc:Fallback>
   </mc:AlternateContent>
@@ -4167,7 +4298,12 @@
             <p:ph type="title"/>
           </p:nvPr>
         </p:nvSpPr>
-        <p:spPr/>
+        <p:spPr>
+          <a:xfrm>
+            <a:off x="3672440" y="458194"/>
+            <a:ext cx="3932237" cy="557619"/>
+          </a:xfrm>
+        </p:spPr>
         <p:txBody>
           <a:bodyPr/>
           <a:lstStyle/>
@@ -4243,35 +4379,57 @@
             <p:ph type="body" sz="half" idx="2"/>
           </p:nvPr>
         </p:nvSpPr>
-        <p:spPr/>
-        <p:txBody>
-          <a:bodyPr/>
-          <a:lstStyle/>
-          <a:p>
-            <a:r>
-              <a:rPr lang="en-GB" dirty="0"/>
-              <a:t>Once you have ran the program, you should find a view similar to that on the right.</a:t>
-            </a:r>
-          </a:p>
-          <a:p>
-            <a:r>
-              <a:rPr lang="en-GB" dirty="0"/>
-              <a:t>Read the instructions, then when you are ready, click the button labelled </a:t>
-            </a:r>
-            <a:r>
-              <a:rPr lang="en-GB" b="1" dirty="0"/>
+        <p:spPr>
+          <a:xfrm>
+            <a:off x="149087" y="1152939"/>
+            <a:ext cx="4939747" cy="4716049"/>
+          </a:xfrm>
+        </p:spPr>
+        <p:txBody>
+          <a:bodyPr>
+            <a:noAutofit/>
+          </a:bodyPr>
+          <a:lstStyle/>
+          <a:p>
+            <a:r>
+              <a:rPr lang="en-GB" sz="3200" b="1"/>
+              <a:t>Read </a:t>
+            </a:r>
+            <a:r>
+              <a:rPr lang="en-GB" sz="3200" b="1" dirty="0"/>
+              <a:t>the instructions, </a:t>
+            </a:r>
+            <a:r>
+              <a:rPr lang="en-GB" sz="3200" dirty="0"/>
+              <a:t>then when you are ready, click the button labelled </a:t>
+            </a:r>
+            <a:r>
+              <a:rPr lang="en-GB" sz="3200" b="1" dirty="0"/>
               <a:t>I’m ready, lets begin</a:t>
             </a:r>
-            <a:endParaRPr lang="en-GB" dirty="0"/>
-          </a:p>
-          <a:p>
-            <a:endParaRPr lang="en-GB" dirty="0"/>
-          </a:p>
-          <a:p>
-            <a:r>
-              <a:rPr lang="en-GB" dirty="0"/>
-              <a:t>If many people are voting, you may be placed in a Queue. You will have to wait until the people ahead of you have finished voting, then you will be allowed to start as above.</a:t>
-            </a:r>
+            <a:endParaRPr lang="en-GB" sz="3200" dirty="0"/>
+          </a:p>
+          <a:p>
+            <a:endParaRPr lang="en-GB" sz="3200" dirty="0"/>
+          </a:p>
+          <a:p>
+            <a:r>
+              <a:rPr lang="en-GB" sz="3200" dirty="0"/>
+              <a:t>If many people are voting, you may be placed in </a:t>
+            </a:r>
+            <a:r>
+              <a:rPr lang="en-GB" sz="3200"/>
+              <a:t>a queue. </a:t>
+            </a:r>
+            <a:r>
+              <a:rPr lang="en-GB" sz="3200" dirty="0"/>
+              <a:t>You will have to wait until the people ahead of you have </a:t>
+            </a:r>
+            <a:r>
+              <a:rPr lang="en-GB" sz="3200"/>
+              <a:t>finished voting.</a:t>
+            </a:r>
+            <a:endParaRPr lang="en-GB" sz="3200" dirty="0"/>
           </a:p>
         </p:txBody>
       </p:sp>
@@ -4378,62 +4536,64 @@
             <p:ph type="body" sz="half" idx="2"/>
           </p:nvPr>
         </p:nvSpPr>
-        <p:spPr/>
+        <p:spPr>
+          <a:xfrm>
+            <a:off x="542775" y="5693364"/>
+            <a:ext cx="10827589" cy="757132"/>
+          </a:xfrm>
+        </p:spPr>
+        <p:txBody>
+          <a:bodyPr>
+            <a:noAutofit/>
+          </a:bodyPr>
+          <a:lstStyle/>
+          <a:p>
+            <a:r>
+              <a:rPr lang="en-GB" sz="2400"/>
+              <a:t>You </a:t>
+            </a:r>
+            <a:r>
+              <a:rPr lang="en-GB" sz="2400" dirty="0"/>
+              <a:t>may also search by tutor group, last name, first name, etc. Note that the number of names you will see below is limited, so you may need to type more letters before you get the person you want.</a:t>
+            </a:r>
+          </a:p>
+        </p:txBody>
+      </p:sp>
+      <p:sp>
+        <p:nvSpPr>
+          <p:cNvPr id="8" name="Title 7">
+            <a:extLst>
+              <a:ext uri="{FF2B5EF4-FFF2-40B4-BE49-F238E27FC236}">
+                <a16:creationId xmlns:a16="http://schemas.microsoft.com/office/drawing/2014/main" id="{1E68D2C0-0889-4F92-BFF6-E81C3A82C78B}"/>
+              </a:ext>
+            </a:extLst>
+          </p:cNvPr>
+          <p:cNvSpPr>
+            <a:spLocks noGrp="1"/>
+          </p:cNvSpPr>
+          <p:nvPr>
+            <p:ph type="title"/>
+          </p:nvPr>
+        </p:nvSpPr>
+        <p:spPr>
+          <a:xfrm>
+            <a:off x="2211388" y="517438"/>
+            <a:ext cx="4736064" cy="626165"/>
+          </a:xfrm>
+        </p:spPr>
         <p:txBody>
           <a:bodyPr/>
           <a:lstStyle/>
           <a:p>
             <a:r>
               <a:rPr lang="en-GB" dirty="0"/>
-              <a:t>For each of the categories, you will be presented with a view similar to the right.</a:t>
-            </a:r>
-          </a:p>
-          <a:p>
-            <a:r>
-              <a:rPr lang="en-GB" dirty="0"/>
-              <a:t>In the white text area, below “First choice” and “Second choice”, you will need to type the name of two people that you are voting for.</a:t>
-            </a:r>
-          </a:p>
-          <a:p>
-            <a:r>
-              <a:rPr lang="en-GB" b="1" dirty="0"/>
-              <a:t>You will need to click one of these names to lock that name into place</a:t>
+              <a:t>How </a:t>
+            </a:r>
+            <a:r>
+              <a:rPr lang="en-GB"/>
+              <a:t>to vote</a:t>
             </a:r>
             <a:endParaRPr lang="en-GB" dirty="0"/>
-          </a:p>
-          <a:p>
-            <a:r>
-              <a:rPr lang="en-GB" dirty="0"/>
-              <a:t>You may also search by tutor group, last name, first name, etc. Note that the number of names you will see below is limited, so you may need to type more letters before you get the person you want.</a:t>
-            </a:r>
-          </a:p>
-        </p:txBody>
-      </p:sp>
-      <p:sp>
-        <p:nvSpPr>
-          <p:cNvPr id="8" name="Title 7">
-            <a:extLst>
-              <a:ext uri="{FF2B5EF4-FFF2-40B4-BE49-F238E27FC236}">
-                <a16:creationId xmlns:a16="http://schemas.microsoft.com/office/drawing/2014/main" id="{1E68D2C0-0889-4F92-BFF6-E81C3A82C78B}"/>
-              </a:ext>
-            </a:extLst>
-          </p:cNvPr>
-          <p:cNvSpPr>
-            <a:spLocks noGrp="1"/>
-          </p:cNvSpPr>
-          <p:nvPr>
-            <p:ph type="title"/>
-          </p:nvPr>
-        </p:nvSpPr>
-        <p:spPr/>
-        <p:txBody>
-          <a:bodyPr/>
-          <a:lstStyle/>
-          <a:p>
-            <a:r>
-              <a:rPr lang="en-GB" dirty="0"/>
-              <a:t>How to vote for people</a:t>
-            </a:r>
           </a:p>
         </p:txBody>
       </p:sp>
@@ -4555,6 +4715,99 @@
                 </a:solidFill>
               </a:rPr>
               <a:t>Auto</a:t>
+            </a:r>
+          </a:p>
+        </p:txBody>
+      </p:sp>
+      <p:sp>
+        <p:nvSpPr>
+          <p:cNvPr id="2" name="Rounded Rectangular Callout 1"/>
+          <p:cNvSpPr/>
+          <p:nvPr/>
+        </p:nvSpPr>
+        <p:spPr>
+          <a:xfrm>
+            <a:off x="7543800" y="3506295"/>
+            <a:ext cx="2814091" cy="1860835"/>
+          </a:xfrm>
+          <a:prstGeom prst="wedgeRoundRectCallout">
+            <a:avLst>
+              <a:gd name="adj1" fmla="val -60324"/>
+              <a:gd name="adj2" fmla="val -82198"/>
+              <a:gd name="adj3" fmla="val 16667"/>
+            </a:avLst>
+          </a:prstGeom>
+        </p:spPr>
+        <p:style>
+          <a:lnRef idx="2">
+            <a:schemeClr val="accent1">
+              <a:shade val="50000"/>
+            </a:schemeClr>
+          </a:lnRef>
+          <a:fillRef idx="1">
+            <a:schemeClr val="accent1"/>
+          </a:fillRef>
+          <a:effectRef idx="0">
+            <a:schemeClr val="accent1"/>
+          </a:effectRef>
+          <a:fontRef idx="minor">
+            <a:schemeClr val="lt1"/>
+          </a:fontRef>
+        </p:style>
+        <p:txBody>
+          <a:bodyPr rtlCol="0" anchor="ctr"/>
+          <a:lstStyle/>
+          <a:p>
+            <a:r>
+              <a:rPr lang="en-GB" sz="2400" b="1" dirty="0"/>
+              <a:t>You will need to click one of these names to lock that name into place</a:t>
+            </a:r>
+            <a:endParaRPr lang="en-GB" sz="2400" dirty="0"/>
+          </a:p>
+        </p:txBody>
+      </p:sp>
+      <p:sp>
+        <p:nvSpPr>
+          <p:cNvPr id="9" name="Rounded Rectangular Callout 8"/>
+          <p:cNvSpPr/>
+          <p:nvPr/>
+        </p:nvSpPr>
+        <p:spPr>
+          <a:xfrm>
+            <a:off x="278296" y="1262270"/>
+            <a:ext cx="4301124" cy="2615799"/>
+          </a:xfrm>
+          <a:prstGeom prst="wedgeRoundRectCallout">
+            <a:avLst>
+              <a:gd name="adj1" fmla="val 63162"/>
+              <a:gd name="adj2" fmla="val 2332"/>
+              <a:gd name="adj3" fmla="val 16667"/>
+            </a:avLst>
+          </a:prstGeom>
+        </p:spPr>
+        <p:style>
+          <a:lnRef idx="2">
+            <a:schemeClr val="accent1">
+              <a:shade val="50000"/>
+            </a:schemeClr>
+          </a:lnRef>
+          <a:fillRef idx="1">
+            <a:schemeClr val="accent1"/>
+          </a:fillRef>
+          <a:effectRef idx="0">
+            <a:schemeClr val="accent1"/>
+          </a:effectRef>
+          <a:fontRef idx="minor">
+            <a:schemeClr val="lt1"/>
+          </a:fontRef>
+        </p:style>
+        <p:txBody>
+          <a:bodyPr rtlCol="0" anchor="ctr"/>
+          <a:lstStyle/>
+          <a:p>
+            <a:r>
+              <a:rPr lang="en-GB" sz="2400" dirty="0"/>
+              <a:t>In the white text area, below “First choice” and “Second choice”, you will need to type the name of two people that you are voting for.</a:t>
             </a:r>
           </a:p>
         </p:txBody>
@@ -4605,14 +4858,19 @@
             <p:ph type="title"/>
           </p:nvPr>
         </p:nvSpPr>
-        <p:spPr/>
+        <p:spPr>
+          <a:xfrm>
+            <a:off x="3400108" y="457200"/>
+            <a:ext cx="3932237" cy="531812"/>
+          </a:xfrm>
+        </p:spPr>
         <p:txBody>
           <a:bodyPr/>
           <a:lstStyle/>
           <a:p>
             <a:r>
               <a:rPr lang="en-GB" dirty="0"/>
-              <a:t>Confirming your votes</a:t>
+              <a:t>Confirm your votes</a:t>
             </a:r>
           </a:p>
         </p:txBody>
@@ -4652,40 +4910,6 @@
           </a:xfrm>
         </p:spPr>
       </p:pic>
-      <p:sp>
-        <p:nvSpPr>
-          <p:cNvPr id="4" name="Text Placeholder 3">
-            <a:extLst>
-              <a:ext uri="{FF2B5EF4-FFF2-40B4-BE49-F238E27FC236}">
-                <a16:creationId xmlns:a16="http://schemas.microsoft.com/office/drawing/2014/main" id="{8B0C147E-4089-4EBD-973C-23660C2605FF}"/>
-              </a:ext>
-            </a:extLst>
-          </p:cNvPr>
-          <p:cNvSpPr>
-            <a:spLocks noGrp="1"/>
-          </p:cNvSpPr>
-          <p:nvPr>
-            <p:ph type="body" sz="half" idx="2"/>
-          </p:nvPr>
-        </p:nvSpPr>
-        <p:spPr/>
-        <p:txBody>
-          <a:bodyPr/>
-          <a:lstStyle/>
-          <a:p>
-            <a:r>
-              <a:rPr lang="en-GB" dirty="0"/>
-              <a:t>You will need to check through each of the categories and ensure any names you have put (or not put) are correct.</a:t>
-            </a:r>
-          </a:p>
-          <a:p>
-            <a:r>
-              <a:rPr lang="en-GB" dirty="0"/>
-              <a:t>Then, hit the “Confirm” button.</a:t>
-            </a:r>
-          </a:p>
-        </p:txBody>
-      </p:sp>
       <p:sp>
         <p:nvSpPr>
           <p:cNvPr id="5" name="Rectangle 4">
@@ -4739,6 +4963,165 @@
                 </a:solidFill>
               </a:rPr>
               <a:t>Auto</a:t>
+            </a:r>
+          </a:p>
+        </p:txBody>
+      </p:sp>
+      <p:sp>
+        <p:nvSpPr>
+          <p:cNvPr id="8" name="Speech Bubble: Rectangle with Corners Rounded 7">
+            <a:extLst>
+              <a:ext uri="{FF2B5EF4-FFF2-40B4-BE49-F238E27FC236}">
+                <a16:creationId xmlns:a16="http://schemas.microsoft.com/office/drawing/2014/main" id="{91E6280D-99B7-4D21-8D28-2962E3D9BE34}"/>
+              </a:ext>
+            </a:extLst>
+          </p:cNvPr>
+          <p:cNvSpPr/>
+          <p:nvPr/>
+        </p:nvSpPr>
+        <p:spPr>
+          <a:xfrm>
+            <a:off x="518160" y="1112525"/>
+            <a:ext cx="2987040" cy="868675"/>
+          </a:xfrm>
+          <a:prstGeom prst="wedgeRoundRectCallout">
+            <a:avLst>
+              <a:gd name="adj1" fmla="val 90577"/>
+              <a:gd name="adj2" fmla="val 30921"/>
+              <a:gd name="adj3" fmla="val 16667"/>
+            </a:avLst>
+          </a:prstGeom>
+        </p:spPr>
+        <p:style>
+          <a:lnRef idx="2">
+            <a:schemeClr val="accent1">
+              <a:shade val="50000"/>
+            </a:schemeClr>
+          </a:lnRef>
+          <a:fillRef idx="1">
+            <a:schemeClr val="accent1"/>
+          </a:fillRef>
+          <a:effectRef idx="0">
+            <a:schemeClr val="accent1"/>
+          </a:effectRef>
+          <a:fontRef idx="minor">
+            <a:schemeClr val="lt1"/>
+          </a:fontRef>
+        </p:style>
+        <p:txBody>
+          <a:bodyPr rtlCol="0" anchor="ctr"/>
+          <a:lstStyle/>
+          <a:p>
+            <a:pPr algn="ctr"/>
+            <a:r>
+              <a:rPr lang="en-GB" dirty="0"/>
+              <a:t>Check that your votes are correct</a:t>
+            </a:r>
+          </a:p>
+        </p:txBody>
+      </p:sp>
+      <p:sp>
+        <p:nvSpPr>
+          <p:cNvPr id="9" name="Speech Bubble: Rectangle with Corners Rounded 8">
+            <a:extLst>
+              <a:ext uri="{FF2B5EF4-FFF2-40B4-BE49-F238E27FC236}">
+                <a16:creationId xmlns:a16="http://schemas.microsoft.com/office/drawing/2014/main" id="{D8EE1151-F2B6-4A5C-A383-6FE509998849}"/>
+              </a:ext>
+            </a:extLst>
+          </p:cNvPr>
+          <p:cNvSpPr/>
+          <p:nvPr/>
+        </p:nvSpPr>
+        <p:spPr>
+          <a:xfrm>
+            <a:off x="518160" y="2260605"/>
+            <a:ext cx="2987040" cy="868675"/>
+          </a:xfrm>
+          <a:prstGeom prst="wedgeRoundRectCallout">
+            <a:avLst>
+              <a:gd name="adj1" fmla="val 95339"/>
+              <a:gd name="adj2" fmla="val 137354"/>
+              <a:gd name="adj3" fmla="val 16667"/>
+            </a:avLst>
+          </a:prstGeom>
+        </p:spPr>
+        <p:style>
+          <a:lnRef idx="2">
+            <a:schemeClr val="accent1">
+              <a:shade val="50000"/>
+            </a:schemeClr>
+          </a:lnRef>
+          <a:fillRef idx="1">
+            <a:schemeClr val="accent1"/>
+          </a:fillRef>
+          <a:effectRef idx="0">
+            <a:schemeClr val="accent1"/>
+          </a:effectRef>
+          <a:fontRef idx="minor">
+            <a:schemeClr val="lt1"/>
+          </a:fontRef>
+        </p:style>
+        <p:txBody>
+          <a:bodyPr rtlCol="0" anchor="ctr"/>
+          <a:lstStyle/>
+          <a:p>
+            <a:pPr algn="ctr"/>
+            <a:r>
+              <a:rPr lang="en-GB" dirty="0"/>
+              <a:t>If they are, hit Confirm to submit them</a:t>
+            </a:r>
+          </a:p>
+        </p:txBody>
+      </p:sp>
+      <p:sp>
+        <p:nvSpPr>
+          <p:cNvPr id="10" name="Speech Bubble: Rectangle with Corners Rounded 9">
+            <a:extLst>
+              <a:ext uri="{FF2B5EF4-FFF2-40B4-BE49-F238E27FC236}">
+                <a16:creationId xmlns:a16="http://schemas.microsoft.com/office/drawing/2014/main" id="{36EBBEB3-5401-4C72-BC58-917B11C62FD5}"/>
+              </a:ext>
+            </a:extLst>
+          </p:cNvPr>
+          <p:cNvSpPr/>
+          <p:nvPr/>
+        </p:nvSpPr>
+        <p:spPr>
+          <a:xfrm>
+            <a:off x="518160" y="3728721"/>
+            <a:ext cx="2987040" cy="2016754"/>
+          </a:xfrm>
+          <a:prstGeom prst="wedgeRoundRectCallout">
+            <a:avLst>
+              <a:gd name="adj1" fmla="val 97040"/>
+              <a:gd name="adj2" fmla="val 32568"/>
+              <a:gd name="adj3" fmla="val 16667"/>
+            </a:avLst>
+          </a:prstGeom>
+        </p:spPr>
+        <p:style>
+          <a:lnRef idx="2">
+            <a:schemeClr val="accent1">
+              <a:shade val="50000"/>
+            </a:schemeClr>
+          </a:lnRef>
+          <a:fillRef idx="1">
+            <a:schemeClr val="accent1"/>
+          </a:fillRef>
+          <a:effectRef idx="0">
+            <a:schemeClr val="accent1"/>
+          </a:effectRef>
+          <a:fontRef idx="minor">
+            <a:schemeClr val="lt1"/>
+          </a:fontRef>
+        </p:style>
+        <p:txBody>
+          <a:bodyPr rtlCol="0" anchor="ctr"/>
+          <a:lstStyle/>
+          <a:p>
+            <a:pPr algn="ctr"/>
+            <a:r>
+              <a:rPr lang="en-GB" dirty="0"/>
+              <a:t>If not, click “Back” and then use the “Previous” button to go back and re-do your votes.</a:t>
             </a:r>
           </a:p>
         </p:txBody>
@@ -4834,7 +5217,7 @@
           </a:p>
           <a:p>
             <a:r>
-              <a:rPr lang="en-GB" b="1" dirty="0"/>
+              <a:rPr lang="en-GB" sz="2000" b="1" dirty="0"/>
               <a:t>You are then able to close the program and log-off the computer.</a:t>
             </a:r>
           </a:p>
@@ -5107,30 +5490,37 @@
               <a:rPr lang="en-GB" sz="2400" dirty="0"/>
               <a:t>Run that program</a:t>
             </a:r>
+            <a:endParaRPr lang="en-GB" dirty="0"/>
           </a:p>
           <a:p>
             <a:pPr marL="457200" indent="-457200">
               <a:buAutoNum type="arabicParenR"/>
             </a:pPr>
             <a:r>
-              <a:rPr lang="en-GB" sz="2000" dirty="0"/>
+              <a:rPr lang="en-GB" sz="2400" dirty="0"/>
               <a:t>Note that the </a:t>
             </a:r>
             <a:r>
-              <a:rPr lang="en-GB" sz="2000" i="1" dirty="0"/>
+              <a:rPr lang="en-GB" sz="2400" i="1" dirty="0"/>
               <a:t>AwardsClient.exe</a:t>
             </a:r>
             <a:r>
-              <a:rPr lang="en-GB" sz="2000" dirty="0"/>
+              <a:rPr lang="en-GB" sz="2400" dirty="0"/>
               <a:t> may have a different, similar, name.</a:t>
             </a:r>
+          </a:p>
+          <a:p>
+            <a:pPr marL="457200" indent="-457200">
+              <a:buAutoNum type="arabicParenR"/>
+            </a:pPr>
+            <a:endParaRPr lang="en-GB" sz="2400" dirty="0"/>
           </a:p>
         </p:txBody>
       </p:sp>
     </p:spTree>
     <p:extLst>
       <p:ext uri="{BB962C8B-B14F-4D97-AF65-F5344CB8AC3E}">
-        <p14:creationId xmlns:p14="http://schemas.microsoft.com/office/powerpoint/2010/main" val="591608587"/>
+        <p14:creationId xmlns:p14="http://schemas.microsoft.com/office/powerpoint/2010/main" val="2099780665"/>
       </p:ext>
     </p:extLst>
   </p:cSld>
@@ -5139,10 +5529,10 @@
   </p:clrMapOvr>
   <mc:AlternateContent xmlns:mc="http://schemas.openxmlformats.org/markup-compatibility/2006">
     <mc:Choice xmlns:p14="http://schemas.microsoft.com/office/powerpoint/2010/main" Requires="p14">
-      <p:transition spd="slow" p14:dur="2000" advTm="10000"/>
+      <p:transition spd="slow" p14:dur="2000" advTm="12000"/>
     </mc:Choice>
     <mc:Fallback>
-      <p:transition spd="slow" advTm="10000"/>
+      <p:transition spd="slow" advTm="12000"/>
     </mc:Fallback>
   </mc:AlternateContent>
 </p:sld>
@@ -5181,7 +5571,12 @@
             <p:ph type="title"/>
           </p:nvPr>
         </p:nvSpPr>
-        <p:spPr/>
+        <p:spPr>
+          <a:xfrm>
+            <a:off x="3672440" y="458194"/>
+            <a:ext cx="3932237" cy="557619"/>
+          </a:xfrm>
+        </p:spPr>
         <p:txBody>
           <a:bodyPr/>
           <a:lstStyle/>
@@ -5257,42 +5652,64 @@
             <p:ph type="body" sz="half" idx="2"/>
           </p:nvPr>
         </p:nvSpPr>
-        <p:spPr/>
-        <p:txBody>
-          <a:bodyPr/>
-          <a:lstStyle/>
-          <a:p>
-            <a:r>
-              <a:rPr lang="en-GB" dirty="0"/>
-              <a:t>Once you have ran the program, you should find a view similar to that on the right.</a:t>
-            </a:r>
-          </a:p>
-          <a:p>
-            <a:r>
-              <a:rPr lang="en-GB" dirty="0"/>
-              <a:t>Read the instructions, then when you are ready, click the button labelled </a:t>
-            </a:r>
-            <a:r>
-              <a:rPr lang="en-GB" b="1" dirty="0"/>
+        <p:spPr>
+          <a:xfrm>
+            <a:off x="149087" y="1152939"/>
+            <a:ext cx="4939747" cy="4716049"/>
+          </a:xfrm>
+        </p:spPr>
+        <p:txBody>
+          <a:bodyPr>
+            <a:noAutofit/>
+          </a:bodyPr>
+          <a:lstStyle/>
+          <a:p>
+            <a:r>
+              <a:rPr lang="en-GB" sz="3200" b="1"/>
+              <a:t>Read </a:t>
+            </a:r>
+            <a:r>
+              <a:rPr lang="en-GB" sz="3200" b="1" dirty="0"/>
+              <a:t>the instructions, </a:t>
+            </a:r>
+            <a:r>
+              <a:rPr lang="en-GB" sz="3200" dirty="0"/>
+              <a:t>then when you are ready, click the button labelled </a:t>
+            </a:r>
+            <a:r>
+              <a:rPr lang="en-GB" sz="3200" b="1" dirty="0"/>
               <a:t>I’m ready, lets begin</a:t>
             </a:r>
-            <a:endParaRPr lang="en-GB" dirty="0"/>
-          </a:p>
-          <a:p>
-            <a:endParaRPr lang="en-GB" dirty="0"/>
-          </a:p>
-          <a:p>
-            <a:r>
-              <a:rPr lang="en-GB" dirty="0"/>
-              <a:t>If many people are voting, you may be placed in a Queue. You will have to wait until the people ahead of you have finished voting, then you will be allowed to start as above.</a:t>
-            </a:r>
+            <a:endParaRPr lang="en-GB" sz="3200" dirty="0"/>
+          </a:p>
+          <a:p>
+            <a:endParaRPr lang="en-GB" sz="3200" dirty="0"/>
+          </a:p>
+          <a:p>
+            <a:r>
+              <a:rPr lang="en-GB" sz="3200" dirty="0"/>
+              <a:t>If many people are voting, you may be placed in </a:t>
+            </a:r>
+            <a:r>
+              <a:rPr lang="en-GB" sz="3200"/>
+              <a:t>a queue. </a:t>
+            </a:r>
+            <a:r>
+              <a:rPr lang="en-GB" sz="3200" dirty="0"/>
+              <a:t>You will have to wait until the people ahead of you have </a:t>
+            </a:r>
+            <a:r>
+              <a:rPr lang="en-GB" sz="3200"/>
+              <a:t>finished voting.</a:t>
+            </a:r>
+            <a:endParaRPr lang="en-GB" sz="3200" dirty="0"/>
           </a:p>
         </p:txBody>
       </p:sp>
     </p:spTree>
     <p:extLst>
       <p:ext uri="{BB962C8B-B14F-4D97-AF65-F5344CB8AC3E}">
-        <p14:creationId xmlns:p14="http://schemas.microsoft.com/office/powerpoint/2010/main" val="921140066"/>
+        <p14:creationId xmlns:p14="http://schemas.microsoft.com/office/powerpoint/2010/main" val="914595422"/>
       </p:ext>
     </p:extLst>
   </p:cSld>
@@ -5343,62 +5760,64 @@
             <p:ph type="body" sz="half" idx="2"/>
           </p:nvPr>
         </p:nvSpPr>
-        <p:spPr/>
+        <p:spPr>
+          <a:xfrm>
+            <a:off x="542775" y="5693364"/>
+            <a:ext cx="10827589" cy="757132"/>
+          </a:xfrm>
+        </p:spPr>
+        <p:txBody>
+          <a:bodyPr>
+            <a:noAutofit/>
+          </a:bodyPr>
+          <a:lstStyle/>
+          <a:p>
+            <a:r>
+              <a:rPr lang="en-GB" sz="2400"/>
+              <a:t>You </a:t>
+            </a:r>
+            <a:r>
+              <a:rPr lang="en-GB" sz="2400" dirty="0"/>
+              <a:t>may also search by tutor group, last name, first name, etc. Note that the number of names you will see below is limited, so you may need to type more letters before you get the person you want.</a:t>
+            </a:r>
+          </a:p>
+        </p:txBody>
+      </p:sp>
+      <p:sp>
+        <p:nvSpPr>
+          <p:cNvPr id="8" name="Title 7">
+            <a:extLst>
+              <a:ext uri="{FF2B5EF4-FFF2-40B4-BE49-F238E27FC236}">
+                <a16:creationId xmlns:a16="http://schemas.microsoft.com/office/drawing/2014/main" id="{1E68D2C0-0889-4F92-BFF6-E81C3A82C78B}"/>
+              </a:ext>
+            </a:extLst>
+          </p:cNvPr>
+          <p:cNvSpPr>
+            <a:spLocks noGrp="1"/>
+          </p:cNvSpPr>
+          <p:nvPr>
+            <p:ph type="title"/>
+          </p:nvPr>
+        </p:nvSpPr>
+        <p:spPr>
+          <a:xfrm>
+            <a:off x="2211388" y="517438"/>
+            <a:ext cx="4736064" cy="626165"/>
+          </a:xfrm>
+        </p:spPr>
         <p:txBody>
           <a:bodyPr/>
           <a:lstStyle/>
           <a:p>
             <a:r>
               <a:rPr lang="en-GB" dirty="0"/>
-              <a:t>For each of the categories, you will be presented with a view similar to the right.</a:t>
-            </a:r>
-          </a:p>
-          <a:p>
-            <a:r>
-              <a:rPr lang="en-GB" dirty="0"/>
-              <a:t>In the white text area, below “First choice” and “Second choice”, you will need to type the name of two people that you are voting for.</a:t>
-            </a:r>
-          </a:p>
-          <a:p>
-            <a:r>
-              <a:rPr lang="en-GB" b="1" dirty="0"/>
-              <a:t>You will need to click one of these names to lock that name into place</a:t>
+              <a:t>How </a:t>
+            </a:r>
+            <a:r>
+              <a:rPr lang="en-GB"/>
+              <a:t>to vote</a:t>
             </a:r>
             <a:endParaRPr lang="en-GB" dirty="0"/>
-          </a:p>
-          <a:p>
-            <a:r>
-              <a:rPr lang="en-GB" dirty="0"/>
-              <a:t>You may also search by tutor group, last name, first name, etc. Note that the number of names you will see below is limited, so you may need to type more letters before you get the person you want.</a:t>
-            </a:r>
-          </a:p>
-        </p:txBody>
-      </p:sp>
-      <p:sp>
-        <p:nvSpPr>
-          <p:cNvPr id="8" name="Title 7">
-            <a:extLst>
-              <a:ext uri="{FF2B5EF4-FFF2-40B4-BE49-F238E27FC236}">
-                <a16:creationId xmlns:a16="http://schemas.microsoft.com/office/drawing/2014/main" id="{1E68D2C0-0889-4F92-BFF6-E81C3A82C78B}"/>
-              </a:ext>
-            </a:extLst>
-          </p:cNvPr>
-          <p:cNvSpPr>
-            <a:spLocks noGrp="1"/>
-          </p:cNvSpPr>
-          <p:nvPr>
-            <p:ph type="title"/>
-          </p:nvPr>
-        </p:nvSpPr>
-        <p:spPr/>
-        <p:txBody>
-          <a:bodyPr/>
-          <a:lstStyle/>
-          <a:p>
-            <a:r>
-              <a:rPr lang="en-GB" dirty="0"/>
-              <a:t>How to vote for people</a:t>
-            </a:r>
           </a:p>
         </p:txBody>
       </p:sp>
@@ -5467,21 +5886,114 @@
           </a:prstGeom>
         </p:spPr>
       </p:pic>
+      <p:sp>
+        <p:nvSpPr>
+          <p:cNvPr id="2" name="Rounded Rectangular Callout 1"/>
+          <p:cNvSpPr/>
+          <p:nvPr/>
+        </p:nvSpPr>
+        <p:spPr>
+          <a:xfrm>
+            <a:off x="7543800" y="3506295"/>
+            <a:ext cx="2814091" cy="1860835"/>
+          </a:xfrm>
+          <a:prstGeom prst="wedgeRoundRectCallout">
+            <a:avLst>
+              <a:gd name="adj1" fmla="val -60324"/>
+              <a:gd name="adj2" fmla="val -82198"/>
+              <a:gd name="adj3" fmla="val 16667"/>
+            </a:avLst>
+          </a:prstGeom>
+        </p:spPr>
+        <p:style>
+          <a:lnRef idx="2">
+            <a:schemeClr val="accent1">
+              <a:shade val="50000"/>
+            </a:schemeClr>
+          </a:lnRef>
+          <a:fillRef idx="1">
+            <a:schemeClr val="accent1"/>
+          </a:fillRef>
+          <a:effectRef idx="0">
+            <a:schemeClr val="accent1"/>
+          </a:effectRef>
+          <a:fontRef idx="minor">
+            <a:schemeClr val="lt1"/>
+          </a:fontRef>
+        </p:style>
+        <p:txBody>
+          <a:bodyPr rtlCol="0" anchor="ctr"/>
+          <a:lstStyle/>
+          <a:p>
+            <a:r>
+              <a:rPr lang="en-GB" sz="2400" b="1" dirty="0"/>
+              <a:t>You will need to click one of these names to lock that name into place</a:t>
+            </a:r>
+            <a:endParaRPr lang="en-GB" sz="2400" dirty="0"/>
+          </a:p>
+        </p:txBody>
+      </p:sp>
+      <p:sp>
+        <p:nvSpPr>
+          <p:cNvPr id="9" name="Rounded Rectangular Callout 8"/>
+          <p:cNvSpPr/>
+          <p:nvPr/>
+        </p:nvSpPr>
+        <p:spPr>
+          <a:xfrm>
+            <a:off x="278296" y="1262270"/>
+            <a:ext cx="4301124" cy="2615799"/>
+          </a:xfrm>
+          <a:prstGeom prst="wedgeRoundRectCallout">
+            <a:avLst>
+              <a:gd name="adj1" fmla="val 63162"/>
+              <a:gd name="adj2" fmla="val 2332"/>
+              <a:gd name="adj3" fmla="val 16667"/>
+            </a:avLst>
+          </a:prstGeom>
+        </p:spPr>
+        <p:style>
+          <a:lnRef idx="2">
+            <a:schemeClr val="accent1">
+              <a:shade val="50000"/>
+            </a:schemeClr>
+          </a:lnRef>
+          <a:fillRef idx="1">
+            <a:schemeClr val="accent1"/>
+          </a:fillRef>
+          <a:effectRef idx="0">
+            <a:schemeClr val="accent1"/>
+          </a:effectRef>
+          <a:fontRef idx="minor">
+            <a:schemeClr val="lt1"/>
+          </a:fontRef>
+        </p:style>
+        <p:txBody>
+          <a:bodyPr rtlCol="0" anchor="ctr"/>
+          <a:lstStyle/>
+          <a:p>
+            <a:r>
+              <a:rPr lang="en-GB" sz="2400" dirty="0"/>
+              <a:t>In the white text area, below “First choice” and “Second choice”, you will need to type the name of two people that you are voting for.</a:t>
+            </a:r>
+          </a:p>
+        </p:txBody>
+      </p:sp>
     </p:spTree>
     <p:extLst>
       <p:ext uri="{BB962C8B-B14F-4D97-AF65-F5344CB8AC3E}">
-        <p14:creationId xmlns:p14="http://schemas.microsoft.com/office/powerpoint/2010/main" val="199657525"/>
+        <p14:creationId xmlns:p14="http://schemas.microsoft.com/office/powerpoint/2010/main" val="55560614"/>
       </p:ext>
     </p:extLst>
   </p:cSld>
   <p:clrMapOvr>
     <a:masterClrMapping/>
   </p:clrMapOvr>
-  <mc:AlternateContent xmlns:mc="http://schemas.openxmlformats.org/markup-compatibility/2006" xmlns:p14="http://schemas.microsoft.com/office/powerpoint/2010/main">
-    <mc:Choice Requires="p14">
+  <mc:AlternateContent xmlns:mc="http://schemas.openxmlformats.org/markup-compatibility/2006">
+    <mc:Choice xmlns:p14="http://schemas.microsoft.com/office/powerpoint/2010/main" Requires="p14">
       <p:transition spd="slow" p14:dur="2000" advTm="10000"/>
     </mc:Choice>
-    <mc:Fallback xmlns="">
+    <mc:Fallback>
       <p:transition spd="slow" advTm="10000"/>
     </mc:Fallback>
   </mc:AlternateContent>

</xml_diff>